<commit_message>
updated Project_Task1 ppt, added IoT slides
</commit_message>
<xml_diff>
--- a/docs/resources/CS684_Project_Task_1.pptx
+++ b/docs/resources/CS684_Project_Task_1.pptx
@@ -14,6 +14,18 @@
     <p:sldId id="259" r:id="rId10"/>
     <p:sldId id="260" r:id="rId11"/>
     <p:sldId id="261" r:id="rId12"/>
+    <p:sldId id="262" r:id="rId13"/>
+    <p:sldId id="263" r:id="rId14"/>
+    <p:sldId id="264" r:id="rId15"/>
+    <p:sldId id="265" r:id="rId16"/>
+    <p:sldId id="266" r:id="rId17"/>
+    <p:sldId id="267" r:id="rId18"/>
+    <p:sldId id="268" r:id="rId19"/>
+    <p:sldId id="269" r:id="rId20"/>
+    <p:sldId id="270" r:id="rId21"/>
+    <p:sldId id="271" r:id="rId22"/>
+    <p:sldId id="272" r:id="rId23"/>
+    <p:sldId id="273" r:id="rId24"/>
   </p:sldIdLst>
   <p:sldSz cy="5143500" cx="9144000"/>
   <p:notesSz cx="6858000" cy="9144000"/>
@@ -790,6 +802,897 @@
 </p:notes>
 </file>
 
+<file path=ppt/notesSlides/notesSlide10.xml><?xml version="1.0" encoding="utf-8"?>
+<p:notes xmlns:a="http://schemas.openxmlformats.org/drawingml/2006/main" xmlns:r="http://schemas.openxmlformats.org/officeDocument/2006/relationships" xmlns:mc="http://schemas.openxmlformats.org/markup-compatibility/2006" xmlns:mv="urn:schemas-microsoft-com:mac:vml" xmlns:p="http://schemas.openxmlformats.org/presentationml/2006/main" xmlns:c="http://schemas.openxmlformats.org/drawingml/2006/chart" xmlns:dgm="http://schemas.openxmlformats.org/drawingml/2006/diagram" xmlns:o="urn:schemas-microsoft-com:office:office" xmlns:v="urn:schemas-microsoft-com:vml" xmlns:pvml="urn:schemas-microsoft-com:office:powerpoint" xmlns:com="http://schemas.openxmlformats.org/drawingml/2006/compatibility" xmlns:p14="http://schemas.microsoft.com/office/powerpoint/2010/main" xmlns:p15="http://schemas.microsoft.com/office/powerpoint/2012/main" xmlns:ahyp="http://schemas.microsoft.com/office/drawing/2018/hyperlinkcolor" showMasterPhAnim="0" showMasterSp="0">
+  <p:cSld>
+    <p:spTree>
+      <p:nvGrpSpPr>
+        <p:cNvPr id="105" name="Shape 105"/>
+        <p:cNvGrpSpPr/>
+        <p:nvPr/>
+      </p:nvGrpSpPr>
+      <p:grpSpPr>
+        <a:xfrm>
+          <a:off x="0" y="0"/>
+          <a:ext cx="0" cy="0"/>
+          <a:chOff x="0" y="0"/>
+          <a:chExt cx="0" cy="0"/>
+        </a:xfrm>
+      </p:grpSpPr>
+      <p:sp>
+        <p:nvSpPr>
+          <p:cNvPr id="106" name="Google Shape;106;gca695b538a_2_15:notes"/>
+          <p:cNvSpPr/>
+          <p:nvPr>
+            <p:ph idx="2" type="sldImg"/>
+          </p:nvPr>
+        </p:nvSpPr>
+        <p:spPr>
+          <a:xfrm>
+            <a:off x="381300" y="685800"/>
+            <a:ext cx="6096000" cy="3429000"/>
+          </a:xfrm>
+          <a:custGeom>
+            <a:rect b="b" l="l" r="r" t="t"/>
+            <a:pathLst>
+              <a:path extrusionOk="0" h="120000" w="120000">
+                <a:moveTo>
+                  <a:pt x="0" y="0"/>
+                </a:moveTo>
+                <a:lnTo>
+                  <a:pt x="120000" y="0"/>
+                </a:lnTo>
+                <a:lnTo>
+                  <a:pt x="120000" y="120000"/>
+                </a:lnTo>
+                <a:lnTo>
+                  <a:pt x="0" y="120000"/>
+                </a:lnTo>
+                <a:close/>
+              </a:path>
+            </a:pathLst>
+          </a:custGeom>
+        </p:spPr>
+      </p:sp>
+      <p:sp>
+        <p:nvSpPr>
+          <p:cNvPr id="107" name="Google Shape;107;gca695b538a_2_15:notes"/>
+          <p:cNvSpPr txBox="1"/>
+          <p:nvPr>
+            <p:ph idx="1" type="body"/>
+          </p:nvPr>
+        </p:nvSpPr>
+        <p:spPr>
+          <a:xfrm>
+            <a:off x="685800" y="4343400"/>
+            <a:ext cx="5486400" cy="4114800"/>
+          </a:xfrm>
+          <a:prstGeom prst="rect">
+            <a:avLst/>
+          </a:prstGeom>
+        </p:spPr>
+        <p:txBody>
+          <a:bodyPr anchorCtr="0" anchor="t" bIns="91425" lIns="91425" spcFirstLastPara="1" rIns="91425" wrap="square" tIns="91425">
+            <a:noAutofit/>
+          </a:bodyPr>
+          <a:lstStyle/>
+          <a:p>
+            <a:pPr indent="0" lvl="0" marL="0" rtl="0" algn="l">
+              <a:spcBef>
+                <a:spcPts val="0"/>
+              </a:spcBef>
+              <a:spcAft>
+                <a:spcPts val="0"/>
+              </a:spcAft>
+              <a:buNone/>
+            </a:pPr>
+            <a:r>
+              <a:t/>
+            </a:r>
+            <a:endParaRPr/>
+          </a:p>
+        </p:txBody>
+      </p:sp>
+    </p:spTree>
+  </p:cSld>
+  <p:clrMapOvr>
+    <a:masterClrMapping/>
+  </p:clrMapOvr>
+</p:notes>
+</file>
+
+<file path=ppt/notesSlides/notesSlide11.xml><?xml version="1.0" encoding="utf-8"?>
+<p:notes xmlns:a="http://schemas.openxmlformats.org/drawingml/2006/main" xmlns:r="http://schemas.openxmlformats.org/officeDocument/2006/relationships" xmlns:mc="http://schemas.openxmlformats.org/markup-compatibility/2006" xmlns:mv="urn:schemas-microsoft-com:mac:vml" xmlns:p="http://schemas.openxmlformats.org/presentationml/2006/main" xmlns:c="http://schemas.openxmlformats.org/drawingml/2006/chart" xmlns:dgm="http://schemas.openxmlformats.org/drawingml/2006/diagram" xmlns:o="urn:schemas-microsoft-com:office:office" xmlns:v="urn:schemas-microsoft-com:vml" xmlns:pvml="urn:schemas-microsoft-com:office:powerpoint" xmlns:com="http://schemas.openxmlformats.org/drawingml/2006/compatibility" xmlns:p14="http://schemas.microsoft.com/office/powerpoint/2010/main" xmlns:p15="http://schemas.microsoft.com/office/powerpoint/2012/main" xmlns:ahyp="http://schemas.microsoft.com/office/drawing/2018/hyperlinkcolor" showMasterPhAnim="0" showMasterSp="0">
+  <p:cSld>
+    <p:spTree>
+      <p:nvGrpSpPr>
+        <p:cNvPr id="111" name="Shape 111"/>
+        <p:cNvGrpSpPr/>
+        <p:nvPr/>
+      </p:nvGrpSpPr>
+      <p:grpSpPr>
+        <a:xfrm>
+          <a:off x="0" y="0"/>
+          <a:ext cx="0" cy="0"/>
+          <a:chOff x="0" y="0"/>
+          <a:chExt cx="0" cy="0"/>
+        </a:xfrm>
+      </p:grpSpPr>
+      <p:sp>
+        <p:nvSpPr>
+          <p:cNvPr id="112" name="Google Shape;112;gca695b538a_2_20:notes"/>
+          <p:cNvSpPr/>
+          <p:nvPr>
+            <p:ph idx="2" type="sldImg"/>
+          </p:nvPr>
+        </p:nvSpPr>
+        <p:spPr>
+          <a:xfrm>
+            <a:off x="381300" y="685800"/>
+            <a:ext cx="6096000" cy="3429000"/>
+          </a:xfrm>
+          <a:custGeom>
+            <a:rect b="b" l="l" r="r" t="t"/>
+            <a:pathLst>
+              <a:path extrusionOk="0" h="120000" w="120000">
+                <a:moveTo>
+                  <a:pt x="0" y="0"/>
+                </a:moveTo>
+                <a:lnTo>
+                  <a:pt x="120000" y="0"/>
+                </a:lnTo>
+                <a:lnTo>
+                  <a:pt x="120000" y="120000"/>
+                </a:lnTo>
+                <a:lnTo>
+                  <a:pt x="0" y="120000"/>
+                </a:lnTo>
+                <a:close/>
+              </a:path>
+            </a:pathLst>
+          </a:custGeom>
+        </p:spPr>
+      </p:sp>
+      <p:sp>
+        <p:nvSpPr>
+          <p:cNvPr id="113" name="Google Shape;113;gca695b538a_2_20:notes"/>
+          <p:cNvSpPr txBox="1"/>
+          <p:nvPr>
+            <p:ph idx="1" type="body"/>
+          </p:nvPr>
+        </p:nvSpPr>
+        <p:spPr>
+          <a:xfrm>
+            <a:off x="685800" y="4343400"/>
+            <a:ext cx="5486400" cy="4114800"/>
+          </a:xfrm>
+          <a:prstGeom prst="rect">
+            <a:avLst/>
+          </a:prstGeom>
+        </p:spPr>
+        <p:txBody>
+          <a:bodyPr anchorCtr="0" anchor="t" bIns="91425" lIns="91425" spcFirstLastPara="1" rIns="91425" wrap="square" tIns="91425">
+            <a:noAutofit/>
+          </a:bodyPr>
+          <a:lstStyle/>
+          <a:p>
+            <a:pPr indent="0" lvl="0" marL="0" rtl="0" algn="l">
+              <a:spcBef>
+                <a:spcPts val="0"/>
+              </a:spcBef>
+              <a:spcAft>
+                <a:spcPts val="0"/>
+              </a:spcAft>
+              <a:buNone/>
+            </a:pPr>
+            <a:r>
+              <a:t/>
+            </a:r>
+            <a:endParaRPr/>
+          </a:p>
+        </p:txBody>
+      </p:sp>
+    </p:spTree>
+  </p:cSld>
+  <p:clrMapOvr>
+    <a:masterClrMapping/>
+  </p:clrMapOvr>
+</p:notes>
+</file>
+
+<file path=ppt/notesSlides/notesSlide12.xml><?xml version="1.0" encoding="utf-8"?>
+<p:notes xmlns:a="http://schemas.openxmlformats.org/drawingml/2006/main" xmlns:r="http://schemas.openxmlformats.org/officeDocument/2006/relationships" xmlns:mc="http://schemas.openxmlformats.org/markup-compatibility/2006" xmlns:mv="urn:schemas-microsoft-com:mac:vml" xmlns:p="http://schemas.openxmlformats.org/presentationml/2006/main" xmlns:c="http://schemas.openxmlformats.org/drawingml/2006/chart" xmlns:dgm="http://schemas.openxmlformats.org/drawingml/2006/diagram" xmlns:o="urn:schemas-microsoft-com:office:office" xmlns:v="urn:schemas-microsoft-com:vml" xmlns:pvml="urn:schemas-microsoft-com:office:powerpoint" xmlns:com="http://schemas.openxmlformats.org/drawingml/2006/compatibility" xmlns:p14="http://schemas.microsoft.com/office/powerpoint/2010/main" xmlns:p15="http://schemas.microsoft.com/office/powerpoint/2012/main" xmlns:ahyp="http://schemas.microsoft.com/office/drawing/2018/hyperlinkcolor" showMasterPhAnim="0" showMasterSp="0">
+  <p:cSld>
+    <p:spTree>
+      <p:nvGrpSpPr>
+        <p:cNvPr id="117" name="Shape 117"/>
+        <p:cNvGrpSpPr/>
+        <p:nvPr/>
+      </p:nvGrpSpPr>
+      <p:grpSpPr>
+        <a:xfrm>
+          <a:off x="0" y="0"/>
+          <a:ext cx="0" cy="0"/>
+          <a:chOff x="0" y="0"/>
+          <a:chExt cx="0" cy="0"/>
+        </a:xfrm>
+      </p:grpSpPr>
+      <p:sp>
+        <p:nvSpPr>
+          <p:cNvPr id="118" name="Google Shape;118;gca695b538a_2_25:notes"/>
+          <p:cNvSpPr/>
+          <p:nvPr>
+            <p:ph idx="2" type="sldImg"/>
+          </p:nvPr>
+        </p:nvSpPr>
+        <p:spPr>
+          <a:xfrm>
+            <a:off x="381300" y="685800"/>
+            <a:ext cx="6096000" cy="3429000"/>
+          </a:xfrm>
+          <a:custGeom>
+            <a:rect b="b" l="l" r="r" t="t"/>
+            <a:pathLst>
+              <a:path extrusionOk="0" h="120000" w="120000">
+                <a:moveTo>
+                  <a:pt x="0" y="0"/>
+                </a:moveTo>
+                <a:lnTo>
+                  <a:pt x="120000" y="0"/>
+                </a:lnTo>
+                <a:lnTo>
+                  <a:pt x="120000" y="120000"/>
+                </a:lnTo>
+                <a:lnTo>
+                  <a:pt x="0" y="120000"/>
+                </a:lnTo>
+                <a:close/>
+              </a:path>
+            </a:pathLst>
+          </a:custGeom>
+        </p:spPr>
+      </p:sp>
+      <p:sp>
+        <p:nvSpPr>
+          <p:cNvPr id="119" name="Google Shape;119;gca695b538a_2_25:notes"/>
+          <p:cNvSpPr txBox="1"/>
+          <p:nvPr>
+            <p:ph idx="1" type="body"/>
+          </p:nvPr>
+        </p:nvSpPr>
+        <p:spPr>
+          <a:xfrm>
+            <a:off x="685800" y="4343400"/>
+            <a:ext cx="5486400" cy="4114800"/>
+          </a:xfrm>
+          <a:prstGeom prst="rect">
+            <a:avLst/>
+          </a:prstGeom>
+        </p:spPr>
+        <p:txBody>
+          <a:bodyPr anchorCtr="0" anchor="t" bIns="91425" lIns="91425" spcFirstLastPara="1" rIns="91425" wrap="square" tIns="91425">
+            <a:noAutofit/>
+          </a:bodyPr>
+          <a:lstStyle/>
+          <a:p>
+            <a:pPr indent="0" lvl="0" marL="0" rtl="0" algn="l">
+              <a:spcBef>
+                <a:spcPts val="0"/>
+              </a:spcBef>
+              <a:spcAft>
+                <a:spcPts val="0"/>
+              </a:spcAft>
+              <a:buNone/>
+            </a:pPr>
+            <a:r>
+              <a:t/>
+            </a:r>
+            <a:endParaRPr/>
+          </a:p>
+        </p:txBody>
+      </p:sp>
+    </p:spTree>
+  </p:cSld>
+  <p:clrMapOvr>
+    <a:masterClrMapping/>
+  </p:clrMapOvr>
+</p:notes>
+</file>
+
+<file path=ppt/notesSlides/notesSlide13.xml><?xml version="1.0" encoding="utf-8"?>
+<p:notes xmlns:a="http://schemas.openxmlformats.org/drawingml/2006/main" xmlns:r="http://schemas.openxmlformats.org/officeDocument/2006/relationships" xmlns:mc="http://schemas.openxmlformats.org/markup-compatibility/2006" xmlns:mv="urn:schemas-microsoft-com:mac:vml" xmlns:p="http://schemas.openxmlformats.org/presentationml/2006/main" xmlns:c="http://schemas.openxmlformats.org/drawingml/2006/chart" xmlns:dgm="http://schemas.openxmlformats.org/drawingml/2006/diagram" xmlns:o="urn:schemas-microsoft-com:office:office" xmlns:v="urn:schemas-microsoft-com:vml" xmlns:pvml="urn:schemas-microsoft-com:office:powerpoint" xmlns:com="http://schemas.openxmlformats.org/drawingml/2006/compatibility" xmlns:p14="http://schemas.microsoft.com/office/powerpoint/2010/main" xmlns:p15="http://schemas.microsoft.com/office/powerpoint/2012/main" xmlns:ahyp="http://schemas.microsoft.com/office/drawing/2018/hyperlinkcolor" showMasterPhAnim="0" showMasterSp="0">
+  <p:cSld>
+    <p:spTree>
+      <p:nvGrpSpPr>
+        <p:cNvPr id="123" name="Shape 123"/>
+        <p:cNvGrpSpPr/>
+        <p:nvPr/>
+      </p:nvGrpSpPr>
+      <p:grpSpPr>
+        <a:xfrm>
+          <a:off x="0" y="0"/>
+          <a:ext cx="0" cy="0"/>
+          <a:chOff x="0" y="0"/>
+          <a:chExt cx="0" cy="0"/>
+        </a:xfrm>
+      </p:grpSpPr>
+      <p:sp>
+        <p:nvSpPr>
+          <p:cNvPr id="124" name="Google Shape;124;gca695b538a_2_30:notes"/>
+          <p:cNvSpPr/>
+          <p:nvPr>
+            <p:ph idx="2" type="sldImg"/>
+          </p:nvPr>
+        </p:nvSpPr>
+        <p:spPr>
+          <a:xfrm>
+            <a:off x="381300" y="685800"/>
+            <a:ext cx="6096000" cy="3429000"/>
+          </a:xfrm>
+          <a:custGeom>
+            <a:rect b="b" l="l" r="r" t="t"/>
+            <a:pathLst>
+              <a:path extrusionOk="0" h="120000" w="120000">
+                <a:moveTo>
+                  <a:pt x="0" y="0"/>
+                </a:moveTo>
+                <a:lnTo>
+                  <a:pt x="120000" y="0"/>
+                </a:lnTo>
+                <a:lnTo>
+                  <a:pt x="120000" y="120000"/>
+                </a:lnTo>
+                <a:lnTo>
+                  <a:pt x="0" y="120000"/>
+                </a:lnTo>
+                <a:close/>
+              </a:path>
+            </a:pathLst>
+          </a:custGeom>
+        </p:spPr>
+      </p:sp>
+      <p:sp>
+        <p:nvSpPr>
+          <p:cNvPr id="125" name="Google Shape;125;gca695b538a_2_30:notes"/>
+          <p:cNvSpPr txBox="1"/>
+          <p:nvPr>
+            <p:ph idx="1" type="body"/>
+          </p:nvPr>
+        </p:nvSpPr>
+        <p:spPr>
+          <a:xfrm>
+            <a:off x="685800" y="4343400"/>
+            <a:ext cx="5486400" cy="4114800"/>
+          </a:xfrm>
+          <a:prstGeom prst="rect">
+            <a:avLst/>
+          </a:prstGeom>
+        </p:spPr>
+        <p:txBody>
+          <a:bodyPr anchorCtr="0" anchor="t" bIns="91425" lIns="91425" spcFirstLastPara="1" rIns="91425" wrap="square" tIns="91425">
+            <a:noAutofit/>
+          </a:bodyPr>
+          <a:lstStyle/>
+          <a:p>
+            <a:pPr indent="0" lvl="0" marL="0" rtl="0" algn="l">
+              <a:spcBef>
+                <a:spcPts val="0"/>
+              </a:spcBef>
+              <a:spcAft>
+                <a:spcPts val="0"/>
+              </a:spcAft>
+              <a:buNone/>
+            </a:pPr>
+            <a:r>
+              <a:t/>
+            </a:r>
+            <a:endParaRPr/>
+          </a:p>
+        </p:txBody>
+      </p:sp>
+    </p:spTree>
+  </p:cSld>
+  <p:clrMapOvr>
+    <a:masterClrMapping/>
+  </p:clrMapOvr>
+</p:notes>
+</file>
+
+<file path=ppt/notesSlides/notesSlide14.xml><?xml version="1.0" encoding="utf-8"?>
+<p:notes xmlns:a="http://schemas.openxmlformats.org/drawingml/2006/main" xmlns:r="http://schemas.openxmlformats.org/officeDocument/2006/relationships" xmlns:mc="http://schemas.openxmlformats.org/markup-compatibility/2006" xmlns:mv="urn:schemas-microsoft-com:mac:vml" xmlns:p="http://schemas.openxmlformats.org/presentationml/2006/main" xmlns:c="http://schemas.openxmlformats.org/drawingml/2006/chart" xmlns:dgm="http://schemas.openxmlformats.org/drawingml/2006/diagram" xmlns:o="urn:schemas-microsoft-com:office:office" xmlns:v="urn:schemas-microsoft-com:vml" xmlns:pvml="urn:schemas-microsoft-com:office:powerpoint" xmlns:com="http://schemas.openxmlformats.org/drawingml/2006/compatibility" xmlns:p14="http://schemas.microsoft.com/office/powerpoint/2010/main" xmlns:p15="http://schemas.microsoft.com/office/powerpoint/2012/main" xmlns:ahyp="http://schemas.microsoft.com/office/drawing/2018/hyperlinkcolor" showMasterPhAnim="0" showMasterSp="0">
+  <p:cSld>
+    <p:spTree>
+      <p:nvGrpSpPr>
+        <p:cNvPr id="129" name="Shape 129"/>
+        <p:cNvGrpSpPr/>
+        <p:nvPr/>
+      </p:nvGrpSpPr>
+      <p:grpSpPr>
+        <a:xfrm>
+          <a:off x="0" y="0"/>
+          <a:ext cx="0" cy="0"/>
+          <a:chOff x="0" y="0"/>
+          <a:chExt cx="0" cy="0"/>
+        </a:xfrm>
+      </p:grpSpPr>
+      <p:sp>
+        <p:nvSpPr>
+          <p:cNvPr id="130" name="Google Shape;130;gca695b538a_2_35:notes"/>
+          <p:cNvSpPr/>
+          <p:nvPr>
+            <p:ph idx="2" type="sldImg"/>
+          </p:nvPr>
+        </p:nvSpPr>
+        <p:spPr>
+          <a:xfrm>
+            <a:off x="381300" y="685800"/>
+            <a:ext cx="6096000" cy="3429000"/>
+          </a:xfrm>
+          <a:custGeom>
+            <a:rect b="b" l="l" r="r" t="t"/>
+            <a:pathLst>
+              <a:path extrusionOk="0" h="120000" w="120000">
+                <a:moveTo>
+                  <a:pt x="0" y="0"/>
+                </a:moveTo>
+                <a:lnTo>
+                  <a:pt x="120000" y="0"/>
+                </a:lnTo>
+                <a:lnTo>
+                  <a:pt x="120000" y="120000"/>
+                </a:lnTo>
+                <a:lnTo>
+                  <a:pt x="0" y="120000"/>
+                </a:lnTo>
+                <a:close/>
+              </a:path>
+            </a:pathLst>
+          </a:custGeom>
+        </p:spPr>
+      </p:sp>
+      <p:sp>
+        <p:nvSpPr>
+          <p:cNvPr id="131" name="Google Shape;131;gca695b538a_2_35:notes"/>
+          <p:cNvSpPr txBox="1"/>
+          <p:nvPr>
+            <p:ph idx="1" type="body"/>
+          </p:nvPr>
+        </p:nvSpPr>
+        <p:spPr>
+          <a:xfrm>
+            <a:off x="685800" y="4343400"/>
+            <a:ext cx="5486400" cy="4114800"/>
+          </a:xfrm>
+          <a:prstGeom prst="rect">
+            <a:avLst/>
+          </a:prstGeom>
+        </p:spPr>
+        <p:txBody>
+          <a:bodyPr anchorCtr="0" anchor="t" bIns="91425" lIns="91425" spcFirstLastPara="1" rIns="91425" wrap="square" tIns="91425">
+            <a:noAutofit/>
+          </a:bodyPr>
+          <a:lstStyle/>
+          <a:p>
+            <a:pPr indent="0" lvl="0" marL="0" rtl="0" algn="l">
+              <a:spcBef>
+                <a:spcPts val="0"/>
+              </a:spcBef>
+              <a:spcAft>
+                <a:spcPts val="0"/>
+              </a:spcAft>
+              <a:buNone/>
+            </a:pPr>
+            <a:r>
+              <a:t/>
+            </a:r>
+            <a:endParaRPr/>
+          </a:p>
+        </p:txBody>
+      </p:sp>
+    </p:spTree>
+  </p:cSld>
+  <p:clrMapOvr>
+    <a:masterClrMapping/>
+  </p:clrMapOvr>
+</p:notes>
+</file>
+
+<file path=ppt/notesSlides/notesSlide15.xml><?xml version="1.0" encoding="utf-8"?>
+<p:notes xmlns:a="http://schemas.openxmlformats.org/drawingml/2006/main" xmlns:r="http://schemas.openxmlformats.org/officeDocument/2006/relationships" xmlns:mc="http://schemas.openxmlformats.org/markup-compatibility/2006" xmlns:mv="urn:schemas-microsoft-com:mac:vml" xmlns:p="http://schemas.openxmlformats.org/presentationml/2006/main" xmlns:c="http://schemas.openxmlformats.org/drawingml/2006/chart" xmlns:dgm="http://schemas.openxmlformats.org/drawingml/2006/diagram" xmlns:o="urn:schemas-microsoft-com:office:office" xmlns:v="urn:schemas-microsoft-com:vml" xmlns:pvml="urn:schemas-microsoft-com:office:powerpoint" xmlns:com="http://schemas.openxmlformats.org/drawingml/2006/compatibility" xmlns:p14="http://schemas.microsoft.com/office/powerpoint/2010/main" xmlns:p15="http://schemas.microsoft.com/office/powerpoint/2012/main" xmlns:ahyp="http://schemas.microsoft.com/office/drawing/2018/hyperlinkcolor" showMasterPhAnim="0" showMasterSp="0">
+  <p:cSld>
+    <p:spTree>
+      <p:nvGrpSpPr>
+        <p:cNvPr id="135" name="Shape 135"/>
+        <p:cNvGrpSpPr/>
+        <p:nvPr/>
+      </p:nvGrpSpPr>
+      <p:grpSpPr>
+        <a:xfrm>
+          <a:off x="0" y="0"/>
+          <a:ext cx="0" cy="0"/>
+          <a:chOff x="0" y="0"/>
+          <a:chExt cx="0" cy="0"/>
+        </a:xfrm>
+      </p:grpSpPr>
+      <p:sp>
+        <p:nvSpPr>
+          <p:cNvPr id="136" name="Google Shape;136;gca695b538a_2_40:notes"/>
+          <p:cNvSpPr/>
+          <p:nvPr>
+            <p:ph idx="2" type="sldImg"/>
+          </p:nvPr>
+        </p:nvSpPr>
+        <p:spPr>
+          <a:xfrm>
+            <a:off x="381300" y="685800"/>
+            <a:ext cx="6096000" cy="3429000"/>
+          </a:xfrm>
+          <a:custGeom>
+            <a:rect b="b" l="l" r="r" t="t"/>
+            <a:pathLst>
+              <a:path extrusionOk="0" h="120000" w="120000">
+                <a:moveTo>
+                  <a:pt x="0" y="0"/>
+                </a:moveTo>
+                <a:lnTo>
+                  <a:pt x="120000" y="0"/>
+                </a:lnTo>
+                <a:lnTo>
+                  <a:pt x="120000" y="120000"/>
+                </a:lnTo>
+                <a:lnTo>
+                  <a:pt x="0" y="120000"/>
+                </a:lnTo>
+                <a:close/>
+              </a:path>
+            </a:pathLst>
+          </a:custGeom>
+        </p:spPr>
+      </p:sp>
+      <p:sp>
+        <p:nvSpPr>
+          <p:cNvPr id="137" name="Google Shape;137;gca695b538a_2_40:notes"/>
+          <p:cNvSpPr txBox="1"/>
+          <p:nvPr>
+            <p:ph idx="1" type="body"/>
+          </p:nvPr>
+        </p:nvSpPr>
+        <p:spPr>
+          <a:xfrm>
+            <a:off x="685800" y="4343400"/>
+            <a:ext cx="5486400" cy="4114800"/>
+          </a:xfrm>
+          <a:prstGeom prst="rect">
+            <a:avLst/>
+          </a:prstGeom>
+        </p:spPr>
+        <p:txBody>
+          <a:bodyPr anchorCtr="0" anchor="t" bIns="91425" lIns="91425" spcFirstLastPara="1" rIns="91425" wrap="square" tIns="91425">
+            <a:noAutofit/>
+          </a:bodyPr>
+          <a:lstStyle/>
+          <a:p>
+            <a:pPr indent="0" lvl="0" marL="0" rtl="0" algn="l">
+              <a:spcBef>
+                <a:spcPts val="0"/>
+              </a:spcBef>
+              <a:spcAft>
+                <a:spcPts val="0"/>
+              </a:spcAft>
+              <a:buNone/>
+            </a:pPr>
+            <a:r>
+              <a:t/>
+            </a:r>
+            <a:endParaRPr/>
+          </a:p>
+        </p:txBody>
+      </p:sp>
+    </p:spTree>
+  </p:cSld>
+  <p:clrMapOvr>
+    <a:masterClrMapping/>
+  </p:clrMapOvr>
+</p:notes>
+</file>
+
+<file path=ppt/notesSlides/notesSlide16.xml><?xml version="1.0" encoding="utf-8"?>
+<p:notes xmlns:a="http://schemas.openxmlformats.org/drawingml/2006/main" xmlns:r="http://schemas.openxmlformats.org/officeDocument/2006/relationships" xmlns:mc="http://schemas.openxmlformats.org/markup-compatibility/2006" xmlns:mv="urn:schemas-microsoft-com:mac:vml" xmlns:p="http://schemas.openxmlformats.org/presentationml/2006/main" xmlns:c="http://schemas.openxmlformats.org/drawingml/2006/chart" xmlns:dgm="http://schemas.openxmlformats.org/drawingml/2006/diagram" xmlns:o="urn:schemas-microsoft-com:office:office" xmlns:v="urn:schemas-microsoft-com:vml" xmlns:pvml="urn:schemas-microsoft-com:office:powerpoint" xmlns:com="http://schemas.openxmlformats.org/drawingml/2006/compatibility" xmlns:p14="http://schemas.microsoft.com/office/powerpoint/2010/main" xmlns:p15="http://schemas.microsoft.com/office/powerpoint/2012/main" xmlns:ahyp="http://schemas.microsoft.com/office/drawing/2018/hyperlinkcolor" showMasterPhAnim="0" showMasterSp="0">
+  <p:cSld>
+    <p:spTree>
+      <p:nvGrpSpPr>
+        <p:cNvPr id="141" name="Shape 141"/>
+        <p:cNvGrpSpPr/>
+        <p:nvPr/>
+      </p:nvGrpSpPr>
+      <p:grpSpPr>
+        <a:xfrm>
+          <a:off x="0" y="0"/>
+          <a:ext cx="0" cy="0"/>
+          <a:chOff x="0" y="0"/>
+          <a:chExt cx="0" cy="0"/>
+        </a:xfrm>
+      </p:grpSpPr>
+      <p:sp>
+        <p:nvSpPr>
+          <p:cNvPr id="142" name="Google Shape;142;gca695b538a_2_45:notes"/>
+          <p:cNvSpPr/>
+          <p:nvPr>
+            <p:ph idx="2" type="sldImg"/>
+          </p:nvPr>
+        </p:nvSpPr>
+        <p:spPr>
+          <a:xfrm>
+            <a:off x="381300" y="685800"/>
+            <a:ext cx="6096000" cy="3429000"/>
+          </a:xfrm>
+          <a:custGeom>
+            <a:rect b="b" l="l" r="r" t="t"/>
+            <a:pathLst>
+              <a:path extrusionOk="0" h="120000" w="120000">
+                <a:moveTo>
+                  <a:pt x="0" y="0"/>
+                </a:moveTo>
+                <a:lnTo>
+                  <a:pt x="120000" y="0"/>
+                </a:lnTo>
+                <a:lnTo>
+                  <a:pt x="120000" y="120000"/>
+                </a:lnTo>
+                <a:lnTo>
+                  <a:pt x="0" y="120000"/>
+                </a:lnTo>
+                <a:close/>
+              </a:path>
+            </a:pathLst>
+          </a:custGeom>
+        </p:spPr>
+      </p:sp>
+      <p:sp>
+        <p:nvSpPr>
+          <p:cNvPr id="143" name="Google Shape;143;gca695b538a_2_45:notes"/>
+          <p:cNvSpPr txBox="1"/>
+          <p:nvPr>
+            <p:ph idx="1" type="body"/>
+          </p:nvPr>
+        </p:nvSpPr>
+        <p:spPr>
+          <a:xfrm>
+            <a:off x="685800" y="4343400"/>
+            <a:ext cx="5486400" cy="4114800"/>
+          </a:xfrm>
+          <a:prstGeom prst="rect">
+            <a:avLst/>
+          </a:prstGeom>
+        </p:spPr>
+        <p:txBody>
+          <a:bodyPr anchorCtr="0" anchor="t" bIns="91425" lIns="91425" spcFirstLastPara="1" rIns="91425" wrap="square" tIns="91425">
+            <a:noAutofit/>
+          </a:bodyPr>
+          <a:lstStyle/>
+          <a:p>
+            <a:pPr indent="0" lvl="0" marL="0" rtl="0" algn="l">
+              <a:spcBef>
+                <a:spcPts val="0"/>
+              </a:spcBef>
+              <a:spcAft>
+                <a:spcPts val="0"/>
+              </a:spcAft>
+              <a:buNone/>
+            </a:pPr>
+            <a:r>
+              <a:t/>
+            </a:r>
+            <a:endParaRPr/>
+          </a:p>
+        </p:txBody>
+      </p:sp>
+    </p:spTree>
+  </p:cSld>
+  <p:clrMapOvr>
+    <a:masterClrMapping/>
+  </p:clrMapOvr>
+</p:notes>
+</file>
+
+<file path=ppt/notesSlides/notesSlide17.xml><?xml version="1.0" encoding="utf-8"?>
+<p:notes xmlns:a="http://schemas.openxmlformats.org/drawingml/2006/main" xmlns:r="http://schemas.openxmlformats.org/officeDocument/2006/relationships" xmlns:mc="http://schemas.openxmlformats.org/markup-compatibility/2006" xmlns:mv="urn:schemas-microsoft-com:mac:vml" xmlns:p="http://schemas.openxmlformats.org/presentationml/2006/main" xmlns:c="http://schemas.openxmlformats.org/drawingml/2006/chart" xmlns:dgm="http://schemas.openxmlformats.org/drawingml/2006/diagram" xmlns:o="urn:schemas-microsoft-com:office:office" xmlns:v="urn:schemas-microsoft-com:vml" xmlns:pvml="urn:schemas-microsoft-com:office:powerpoint" xmlns:com="http://schemas.openxmlformats.org/drawingml/2006/compatibility" xmlns:p14="http://schemas.microsoft.com/office/powerpoint/2010/main" xmlns:p15="http://schemas.microsoft.com/office/powerpoint/2012/main" xmlns:ahyp="http://schemas.microsoft.com/office/drawing/2018/hyperlinkcolor" showMasterPhAnim="0" showMasterSp="0">
+  <p:cSld>
+    <p:spTree>
+      <p:nvGrpSpPr>
+        <p:cNvPr id="147" name="Shape 147"/>
+        <p:cNvGrpSpPr/>
+        <p:nvPr/>
+      </p:nvGrpSpPr>
+      <p:grpSpPr>
+        <a:xfrm>
+          <a:off x="0" y="0"/>
+          <a:ext cx="0" cy="0"/>
+          <a:chOff x="0" y="0"/>
+          <a:chExt cx="0" cy="0"/>
+        </a:xfrm>
+      </p:grpSpPr>
+      <p:sp>
+        <p:nvSpPr>
+          <p:cNvPr id="148" name="Google Shape;148;gca695b538a_2_50:notes"/>
+          <p:cNvSpPr/>
+          <p:nvPr>
+            <p:ph idx="2" type="sldImg"/>
+          </p:nvPr>
+        </p:nvSpPr>
+        <p:spPr>
+          <a:xfrm>
+            <a:off x="381300" y="685800"/>
+            <a:ext cx="6096000" cy="3429000"/>
+          </a:xfrm>
+          <a:custGeom>
+            <a:rect b="b" l="l" r="r" t="t"/>
+            <a:pathLst>
+              <a:path extrusionOk="0" h="120000" w="120000">
+                <a:moveTo>
+                  <a:pt x="0" y="0"/>
+                </a:moveTo>
+                <a:lnTo>
+                  <a:pt x="120000" y="0"/>
+                </a:lnTo>
+                <a:lnTo>
+                  <a:pt x="120000" y="120000"/>
+                </a:lnTo>
+                <a:lnTo>
+                  <a:pt x="0" y="120000"/>
+                </a:lnTo>
+                <a:close/>
+              </a:path>
+            </a:pathLst>
+          </a:custGeom>
+        </p:spPr>
+      </p:sp>
+      <p:sp>
+        <p:nvSpPr>
+          <p:cNvPr id="149" name="Google Shape;149;gca695b538a_2_50:notes"/>
+          <p:cNvSpPr txBox="1"/>
+          <p:nvPr>
+            <p:ph idx="1" type="body"/>
+          </p:nvPr>
+        </p:nvSpPr>
+        <p:spPr>
+          <a:xfrm>
+            <a:off x="685800" y="4343400"/>
+            <a:ext cx="5486400" cy="4114800"/>
+          </a:xfrm>
+          <a:prstGeom prst="rect">
+            <a:avLst/>
+          </a:prstGeom>
+        </p:spPr>
+        <p:txBody>
+          <a:bodyPr anchorCtr="0" anchor="t" bIns="91425" lIns="91425" spcFirstLastPara="1" rIns="91425" wrap="square" tIns="91425">
+            <a:noAutofit/>
+          </a:bodyPr>
+          <a:lstStyle/>
+          <a:p>
+            <a:pPr indent="0" lvl="0" marL="0" rtl="0" algn="l">
+              <a:spcBef>
+                <a:spcPts val="0"/>
+              </a:spcBef>
+              <a:spcAft>
+                <a:spcPts val="0"/>
+              </a:spcAft>
+              <a:buNone/>
+            </a:pPr>
+            <a:r>
+              <a:t/>
+            </a:r>
+            <a:endParaRPr/>
+          </a:p>
+        </p:txBody>
+      </p:sp>
+    </p:spTree>
+  </p:cSld>
+  <p:clrMapOvr>
+    <a:masterClrMapping/>
+  </p:clrMapOvr>
+</p:notes>
+</file>
+
+<file path=ppt/notesSlides/notesSlide18.xml><?xml version="1.0" encoding="utf-8"?>
+<p:notes xmlns:a="http://schemas.openxmlformats.org/drawingml/2006/main" xmlns:r="http://schemas.openxmlformats.org/officeDocument/2006/relationships" xmlns:mc="http://schemas.openxmlformats.org/markup-compatibility/2006" xmlns:mv="urn:schemas-microsoft-com:mac:vml" xmlns:p="http://schemas.openxmlformats.org/presentationml/2006/main" xmlns:c="http://schemas.openxmlformats.org/drawingml/2006/chart" xmlns:dgm="http://schemas.openxmlformats.org/drawingml/2006/diagram" xmlns:o="urn:schemas-microsoft-com:office:office" xmlns:v="urn:schemas-microsoft-com:vml" xmlns:pvml="urn:schemas-microsoft-com:office:powerpoint" xmlns:com="http://schemas.openxmlformats.org/drawingml/2006/compatibility" xmlns:p14="http://schemas.microsoft.com/office/powerpoint/2010/main" xmlns:p15="http://schemas.microsoft.com/office/powerpoint/2012/main" xmlns:ahyp="http://schemas.microsoft.com/office/drawing/2018/hyperlinkcolor" showMasterPhAnim="0" showMasterSp="0">
+  <p:cSld>
+    <p:spTree>
+      <p:nvGrpSpPr>
+        <p:cNvPr id="153" name="Shape 153"/>
+        <p:cNvGrpSpPr/>
+        <p:nvPr/>
+      </p:nvGrpSpPr>
+      <p:grpSpPr>
+        <a:xfrm>
+          <a:off x="0" y="0"/>
+          <a:ext cx="0" cy="0"/>
+          <a:chOff x="0" y="0"/>
+          <a:chExt cx="0" cy="0"/>
+        </a:xfrm>
+      </p:grpSpPr>
+      <p:sp>
+        <p:nvSpPr>
+          <p:cNvPr id="154" name="Google Shape;154;gca695b538a_2_55:notes"/>
+          <p:cNvSpPr/>
+          <p:nvPr>
+            <p:ph idx="2" type="sldImg"/>
+          </p:nvPr>
+        </p:nvSpPr>
+        <p:spPr>
+          <a:xfrm>
+            <a:off x="381300" y="685800"/>
+            <a:ext cx="6096000" cy="3429000"/>
+          </a:xfrm>
+          <a:custGeom>
+            <a:rect b="b" l="l" r="r" t="t"/>
+            <a:pathLst>
+              <a:path extrusionOk="0" h="120000" w="120000">
+                <a:moveTo>
+                  <a:pt x="0" y="0"/>
+                </a:moveTo>
+                <a:lnTo>
+                  <a:pt x="120000" y="0"/>
+                </a:lnTo>
+                <a:lnTo>
+                  <a:pt x="120000" y="120000"/>
+                </a:lnTo>
+                <a:lnTo>
+                  <a:pt x="0" y="120000"/>
+                </a:lnTo>
+                <a:close/>
+              </a:path>
+            </a:pathLst>
+          </a:custGeom>
+        </p:spPr>
+      </p:sp>
+      <p:sp>
+        <p:nvSpPr>
+          <p:cNvPr id="155" name="Google Shape;155;gca695b538a_2_55:notes"/>
+          <p:cNvSpPr txBox="1"/>
+          <p:nvPr>
+            <p:ph idx="1" type="body"/>
+          </p:nvPr>
+        </p:nvSpPr>
+        <p:spPr>
+          <a:xfrm>
+            <a:off x="685800" y="4343400"/>
+            <a:ext cx="5486400" cy="4114800"/>
+          </a:xfrm>
+          <a:prstGeom prst="rect">
+            <a:avLst/>
+          </a:prstGeom>
+        </p:spPr>
+        <p:txBody>
+          <a:bodyPr anchorCtr="0" anchor="t" bIns="91425" lIns="91425" spcFirstLastPara="1" rIns="91425" wrap="square" tIns="91425">
+            <a:noAutofit/>
+          </a:bodyPr>
+          <a:lstStyle/>
+          <a:p>
+            <a:pPr indent="0" lvl="0" marL="0" rtl="0" algn="l">
+              <a:spcBef>
+                <a:spcPts val="0"/>
+              </a:spcBef>
+              <a:spcAft>
+                <a:spcPts val="0"/>
+              </a:spcAft>
+              <a:buNone/>
+            </a:pPr>
+            <a:r>
+              <a:t/>
+            </a:r>
+            <a:endParaRPr/>
+          </a:p>
+        </p:txBody>
+      </p:sp>
+    </p:spTree>
+  </p:cSld>
+  <p:clrMapOvr>
+    <a:masterClrMapping/>
+  </p:clrMapOvr>
+</p:notes>
+</file>
+
 <file path=ppt/notesSlides/notesSlide2.xml><?xml version="1.0" encoding="utf-8"?>
 <p:notes xmlns:a="http://schemas.openxmlformats.org/drawingml/2006/main" xmlns:r="http://schemas.openxmlformats.org/officeDocument/2006/relationships" xmlns:mc="http://schemas.openxmlformats.org/markup-compatibility/2006" xmlns:mv="urn:schemas-microsoft-com:mac:vml" xmlns:p="http://schemas.openxmlformats.org/presentationml/2006/main" xmlns:c="http://schemas.openxmlformats.org/drawingml/2006/chart" xmlns:dgm="http://schemas.openxmlformats.org/drawingml/2006/diagram" xmlns:o="urn:schemas-microsoft-com:office:office" xmlns:v="urn:schemas-microsoft-com:vml" xmlns:pvml="urn:schemas-microsoft-com:office:powerpoint" xmlns:com="http://schemas.openxmlformats.org/drawingml/2006/compatibility" xmlns:p14="http://schemas.microsoft.com/office/powerpoint/2010/main" xmlns:p15="http://schemas.microsoft.com/office/powerpoint/2012/main" xmlns:ahyp="http://schemas.microsoft.com/office/drawing/2018/hyperlinkcolor" showMasterPhAnim="0" showMasterSp="0">
   <p:cSld>
@@ -1241,6 +2144,303 @@
       <p:sp>
         <p:nvSpPr>
           <p:cNvPr id="83" name="Google Shape;83;gc95864d5d0_0_0:notes"/>
+          <p:cNvSpPr txBox="1"/>
+          <p:nvPr>
+            <p:ph idx="1" type="body"/>
+          </p:nvPr>
+        </p:nvSpPr>
+        <p:spPr>
+          <a:xfrm>
+            <a:off x="685800" y="4343400"/>
+            <a:ext cx="5486400" cy="4114800"/>
+          </a:xfrm>
+          <a:prstGeom prst="rect">
+            <a:avLst/>
+          </a:prstGeom>
+        </p:spPr>
+        <p:txBody>
+          <a:bodyPr anchorCtr="0" anchor="t" bIns="91425" lIns="91425" spcFirstLastPara="1" rIns="91425" wrap="square" tIns="91425">
+            <a:noAutofit/>
+          </a:bodyPr>
+          <a:lstStyle/>
+          <a:p>
+            <a:pPr indent="0" lvl="0" marL="0" rtl="0" algn="l">
+              <a:spcBef>
+                <a:spcPts val="0"/>
+              </a:spcBef>
+              <a:spcAft>
+                <a:spcPts val="0"/>
+              </a:spcAft>
+              <a:buNone/>
+            </a:pPr>
+            <a:r>
+              <a:t/>
+            </a:r>
+            <a:endParaRPr/>
+          </a:p>
+        </p:txBody>
+      </p:sp>
+    </p:spTree>
+  </p:cSld>
+  <p:clrMapOvr>
+    <a:masterClrMapping/>
+  </p:clrMapOvr>
+</p:notes>
+</file>
+
+<file path=ppt/notesSlides/notesSlide7.xml><?xml version="1.0" encoding="utf-8"?>
+<p:notes xmlns:a="http://schemas.openxmlformats.org/drawingml/2006/main" xmlns:r="http://schemas.openxmlformats.org/officeDocument/2006/relationships" xmlns:mc="http://schemas.openxmlformats.org/markup-compatibility/2006" xmlns:mv="urn:schemas-microsoft-com:mac:vml" xmlns:p="http://schemas.openxmlformats.org/presentationml/2006/main" xmlns:c="http://schemas.openxmlformats.org/drawingml/2006/chart" xmlns:dgm="http://schemas.openxmlformats.org/drawingml/2006/diagram" xmlns:o="urn:schemas-microsoft-com:office:office" xmlns:v="urn:schemas-microsoft-com:vml" xmlns:pvml="urn:schemas-microsoft-com:office:powerpoint" xmlns:com="http://schemas.openxmlformats.org/drawingml/2006/compatibility" xmlns:p14="http://schemas.microsoft.com/office/powerpoint/2010/main" xmlns:p15="http://schemas.microsoft.com/office/powerpoint/2012/main" xmlns:ahyp="http://schemas.microsoft.com/office/drawing/2018/hyperlinkcolor" showMasterPhAnim="0" showMasterSp="0">
+  <p:cSld>
+    <p:spTree>
+      <p:nvGrpSpPr>
+        <p:cNvPr id="87" name="Shape 87"/>
+        <p:cNvGrpSpPr/>
+        <p:nvPr/>
+      </p:nvGrpSpPr>
+      <p:grpSpPr>
+        <a:xfrm>
+          <a:off x="0" y="0"/>
+          <a:ext cx="0" cy="0"/>
+          <a:chOff x="0" y="0"/>
+          <a:chExt cx="0" cy="0"/>
+        </a:xfrm>
+      </p:grpSpPr>
+      <p:sp>
+        <p:nvSpPr>
+          <p:cNvPr id="88" name="Google Shape;88;gca695b538a_2_0:notes"/>
+          <p:cNvSpPr/>
+          <p:nvPr>
+            <p:ph idx="2" type="sldImg"/>
+          </p:nvPr>
+        </p:nvSpPr>
+        <p:spPr>
+          <a:xfrm>
+            <a:off x="381300" y="685800"/>
+            <a:ext cx="6096000" cy="3429000"/>
+          </a:xfrm>
+          <a:custGeom>
+            <a:rect b="b" l="l" r="r" t="t"/>
+            <a:pathLst>
+              <a:path extrusionOk="0" h="120000" w="120000">
+                <a:moveTo>
+                  <a:pt x="0" y="0"/>
+                </a:moveTo>
+                <a:lnTo>
+                  <a:pt x="120000" y="0"/>
+                </a:lnTo>
+                <a:lnTo>
+                  <a:pt x="120000" y="120000"/>
+                </a:lnTo>
+                <a:lnTo>
+                  <a:pt x="0" y="120000"/>
+                </a:lnTo>
+                <a:close/>
+              </a:path>
+            </a:pathLst>
+          </a:custGeom>
+        </p:spPr>
+      </p:sp>
+      <p:sp>
+        <p:nvSpPr>
+          <p:cNvPr id="89" name="Google Shape;89;gca695b538a_2_0:notes"/>
+          <p:cNvSpPr txBox="1"/>
+          <p:nvPr>
+            <p:ph idx="1" type="body"/>
+          </p:nvPr>
+        </p:nvSpPr>
+        <p:spPr>
+          <a:xfrm>
+            <a:off x="685800" y="4343400"/>
+            <a:ext cx="5486400" cy="4114800"/>
+          </a:xfrm>
+          <a:prstGeom prst="rect">
+            <a:avLst/>
+          </a:prstGeom>
+        </p:spPr>
+        <p:txBody>
+          <a:bodyPr anchorCtr="0" anchor="t" bIns="91425" lIns="91425" spcFirstLastPara="1" rIns="91425" wrap="square" tIns="91425">
+            <a:noAutofit/>
+          </a:bodyPr>
+          <a:lstStyle/>
+          <a:p>
+            <a:pPr indent="0" lvl="0" marL="0" rtl="0" algn="l">
+              <a:spcBef>
+                <a:spcPts val="0"/>
+              </a:spcBef>
+              <a:spcAft>
+                <a:spcPts val="0"/>
+              </a:spcAft>
+              <a:buNone/>
+            </a:pPr>
+            <a:r>
+              <a:t/>
+            </a:r>
+            <a:endParaRPr/>
+          </a:p>
+        </p:txBody>
+      </p:sp>
+    </p:spTree>
+  </p:cSld>
+  <p:clrMapOvr>
+    <a:masterClrMapping/>
+  </p:clrMapOvr>
+</p:notes>
+</file>
+
+<file path=ppt/notesSlides/notesSlide8.xml><?xml version="1.0" encoding="utf-8"?>
+<p:notes xmlns:a="http://schemas.openxmlformats.org/drawingml/2006/main" xmlns:r="http://schemas.openxmlformats.org/officeDocument/2006/relationships" xmlns:mc="http://schemas.openxmlformats.org/markup-compatibility/2006" xmlns:mv="urn:schemas-microsoft-com:mac:vml" xmlns:p="http://schemas.openxmlformats.org/presentationml/2006/main" xmlns:c="http://schemas.openxmlformats.org/drawingml/2006/chart" xmlns:dgm="http://schemas.openxmlformats.org/drawingml/2006/diagram" xmlns:o="urn:schemas-microsoft-com:office:office" xmlns:v="urn:schemas-microsoft-com:vml" xmlns:pvml="urn:schemas-microsoft-com:office:powerpoint" xmlns:com="http://schemas.openxmlformats.org/drawingml/2006/compatibility" xmlns:p14="http://schemas.microsoft.com/office/powerpoint/2010/main" xmlns:p15="http://schemas.microsoft.com/office/powerpoint/2012/main" xmlns:ahyp="http://schemas.microsoft.com/office/drawing/2018/hyperlinkcolor" showMasterPhAnim="0" showMasterSp="0">
+  <p:cSld>
+    <p:spTree>
+      <p:nvGrpSpPr>
+        <p:cNvPr id="93" name="Shape 93"/>
+        <p:cNvGrpSpPr/>
+        <p:nvPr/>
+      </p:nvGrpSpPr>
+      <p:grpSpPr>
+        <a:xfrm>
+          <a:off x="0" y="0"/>
+          <a:ext cx="0" cy="0"/>
+          <a:chOff x="0" y="0"/>
+          <a:chExt cx="0" cy="0"/>
+        </a:xfrm>
+      </p:grpSpPr>
+      <p:sp>
+        <p:nvSpPr>
+          <p:cNvPr id="94" name="Google Shape;94;gca695b538a_2_5:notes"/>
+          <p:cNvSpPr/>
+          <p:nvPr>
+            <p:ph idx="2" type="sldImg"/>
+          </p:nvPr>
+        </p:nvSpPr>
+        <p:spPr>
+          <a:xfrm>
+            <a:off x="381300" y="685800"/>
+            <a:ext cx="6096000" cy="3429000"/>
+          </a:xfrm>
+          <a:custGeom>
+            <a:rect b="b" l="l" r="r" t="t"/>
+            <a:pathLst>
+              <a:path extrusionOk="0" h="120000" w="120000">
+                <a:moveTo>
+                  <a:pt x="0" y="0"/>
+                </a:moveTo>
+                <a:lnTo>
+                  <a:pt x="120000" y="0"/>
+                </a:lnTo>
+                <a:lnTo>
+                  <a:pt x="120000" y="120000"/>
+                </a:lnTo>
+                <a:lnTo>
+                  <a:pt x="0" y="120000"/>
+                </a:lnTo>
+                <a:close/>
+              </a:path>
+            </a:pathLst>
+          </a:custGeom>
+        </p:spPr>
+      </p:sp>
+      <p:sp>
+        <p:nvSpPr>
+          <p:cNvPr id="95" name="Google Shape;95;gca695b538a_2_5:notes"/>
+          <p:cNvSpPr txBox="1"/>
+          <p:nvPr>
+            <p:ph idx="1" type="body"/>
+          </p:nvPr>
+        </p:nvSpPr>
+        <p:spPr>
+          <a:xfrm>
+            <a:off x="685800" y="4343400"/>
+            <a:ext cx="5486400" cy="4114800"/>
+          </a:xfrm>
+          <a:prstGeom prst="rect">
+            <a:avLst/>
+          </a:prstGeom>
+        </p:spPr>
+        <p:txBody>
+          <a:bodyPr anchorCtr="0" anchor="t" bIns="91425" lIns="91425" spcFirstLastPara="1" rIns="91425" wrap="square" tIns="91425">
+            <a:noAutofit/>
+          </a:bodyPr>
+          <a:lstStyle/>
+          <a:p>
+            <a:pPr indent="0" lvl="0" marL="0" rtl="0" algn="l">
+              <a:spcBef>
+                <a:spcPts val="0"/>
+              </a:spcBef>
+              <a:spcAft>
+                <a:spcPts val="0"/>
+              </a:spcAft>
+              <a:buNone/>
+            </a:pPr>
+            <a:r>
+              <a:t/>
+            </a:r>
+            <a:endParaRPr/>
+          </a:p>
+        </p:txBody>
+      </p:sp>
+    </p:spTree>
+  </p:cSld>
+  <p:clrMapOvr>
+    <a:masterClrMapping/>
+  </p:clrMapOvr>
+</p:notes>
+</file>
+
+<file path=ppt/notesSlides/notesSlide9.xml><?xml version="1.0" encoding="utf-8"?>
+<p:notes xmlns:a="http://schemas.openxmlformats.org/drawingml/2006/main" xmlns:r="http://schemas.openxmlformats.org/officeDocument/2006/relationships" xmlns:mc="http://schemas.openxmlformats.org/markup-compatibility/2006" xmlns:mv="urn:schemas-microsoft-com:mac:vml" xmlns:p="http://schemas.openxmlformats.org/presentationml/2006/main" xmlns:c="http://schemas.openxmlformats.org/drawingml/2006/chart" xmlns:dgm="http://schemas.openxmlformats.org/drawingml/2006/diagram" xmlns:o="urn:schemas-microsoft-com:office:office" xmlns:v="urn:schemas-microsoft-com:vml" xmlns:pvml="urn:schemas-microsoft-com:office:powerpoint" xmlns:com="http://schemas.openxmlformats.org/drawingml/2006/compatibility" xmlns:p14="http://schemas.microsoft.com/office/powerpoint/2010/main" xmlns:p15="http://schemas.microsoft.com/office/powerpoint/2012/main" xmlns:ahyp="http://schemas.microsoft.com/office/drawing/2018/hyperlinkcolor" showMasterPhAnim="0" showMasterSp="0">
+  <p:cSld>
+    <p:spTree>
+      <p:nvGrpSpPr>
+        <p:cNvPr id="99" name="Shape 99"/>
+        <p:cNvGrpSpPr/>
+        <p:nvPr/>
+      </p:nvGrpSpPr>
+      <p:grpSpPr>
+        <a:xfrm>
+          <a:off x="0" y="0"/>
+          <a:ext cx="0" cy="0"/>
+          <a:chOff x="0" y="0"/>
+          <a:chExt cx="0" cy="0"/>
+        </a:xfrm>
+      </p:grpSpPr>
+      <p:sp>
+        <p:nvSpPr>
+          <p:cNvPr id="100" name="Google Shape;100;gca695b538a_2_10:notes"/>
+          <p:cNvSpPr/>
+          <p:nvPr>
+            <p:ph idx="2" type="sldImg"/>
+          </p:nvPr>
+        </p:nvSpPr>
+        <p:spPr>
+          <a:xfrm>
+            <a:off x="381300" y="685800"/>
+            <a:ext cx="6096000" cy="3429000"/>
+          </a:xfrm>
+          <a:custGeom>
+            <a:rect b="b" l="l" r="r" t="t"/>
+            <a:pathLst>
+              <a:path extrusionOk="0" h="120000" w="120000">
+                <a:moveTo>
+                  <a:pt x="0" y="0"/>
+                </a:moveTo>
+                <a:lnTo>
+                  <a:pt x="120000" y="0"/>
+                </a:lnTo>
+                <a:lnTo>
+                  <a:pt x="120000" y="120000"/>
+                </a:lnTo>
+                <a:lnTo>
+                  <a:pt x="0" y="120000"/>
+                </a:lnTo>
+                <a:close/>
+              </a:path>
+            </a:pathLst>
+          </a:custGeom>
+        </p:spPr>
+      </p:sp>
+      <p:sp>
+        <p:nvSpPr>
+          <p:cNvPr id="101" name="Google Shape;101;gca695b538a_2_10:notes"/>
           <p:cNvSpPr txBox="1"/>
           <p:nvPr>
             <p:ph idx="1" type="body"/>
@@ -6062,6 +7262,1904 @@
 </p:sld>
 </file>
 
+<file path=ppt/slides/slide10.xml><?xml version="1.0" encoding="utf-8"?>
+<p:sld xmlns:a="http://schemas.openxmlformats.org/drawingml/2006/main" xmlns:r="http://schemas.openxmlformats.org/officeDocument/2006/relationships" xmlns:mc="http://schemas.openxmlformats.org/markup-compatibility/2006" xmlns:mv="urn:schemas-microsoft-com:mac:vml" xmlns:p="http://schemas.openxmlformats.org/presentationml/2006/main" xmlns:c="http://schemas.openxmlformats.org/drawingml/2006/chart" xmlns:dgm="http://schemas.openxmlformats.org/drawingml/2006/diagram" xmlns:o="urn:schemas-microsoft-com:office:office" xmlns:v="urn:schemas-microsoft-com:vml" xmlns:pvml="urn:schemas-microsoft-com:office:powerpoint" xmlns:com="http://schemas.openxmlformats.org/drawingml/2006/compatibility" xmlns:p14="http://schemas.microsoft.com/office/powerpoint/2010/main" xmlns:p15="http://schemas.microsoft.com/office/powerpoint/2012/main" xmlns:ahyp="http://schemas.microsoft.com/office/drawing/2018/hyperlinkcolor">
+  <p:cSld>
+    <p:spTree>
+      <p:nvGrpSpPr>
+        <p:cNvPr id="108" name="Shape 108"/>
+        <p:cNvGrpSpPr/>
+        <p:nvPr/>
+      </p:nvGrpSpPr>
+      <p:grpSpPr>
+        <a:xfrm>
+          <a:off x="0" y="0"/>
+          <a:ext cx="0" cy="0"/>
+          <a:chOff x="0" y="0"/>
+          <a:chExt cx="0" cy="0"/>
+        </a:xfrm>
+      </p:grpSpPr>
+      <p:sp>
+        <p:nvSpPr>
+          <p:cNvPr id="109" name="Google Shape;109;p22"/>
+          <p:cNvSpPr txBox="1"/>
+          <p:nvPr>
+            <p:ph type="title"/>
+          </p:nvPr>
+        </p:nvSpPr>
+        <p:spPr>
+          <a:xfrm>
+            <a:off x="311700" y="445025"/>
+            <a:ext cx="8520600" cy="572700"/>
+          </a:xfrm>
+          <a:prstGeom prst="rect">
+            <a:avLst/>
+          </a:prstGeom>
+        </p:spPr>
+        <p:txBody>
+          <a:bodyPr anchorCtr="0" anchor="t" bIns="91425" lIns="91425" spcFirstLastPara="1" rIns="91425" wrap="square" tIns="91425">
+            <a:normAutofit fontScale="90000"/>
+          </a:bodyPr>
+          <a:lstStyle/>
+          <a:p>
+            <a:pPr indent="0" lvl="0" marL="0" rtl="0" algn="l">
+              <a:spcBef>
+                <a:spcPts val="0"/>
+              </a:spcBef>
+              <a:spcAft>
+                <a:spcPts val="0"/>
+              </a:spcAft>
+              <a:buNone/>
+            </a:pPr>
+            <a:r>
+              <a:rPr lang="en-GB"/>
+              <a:t>Communication</a:t>
+            </a:r>
+            <a:endParaRPr/>
+          </a:p>
+        </p:txBody>
+      </p:sp>
+      <p:sp>
+        <p:nvSpPr>
+          <p:cNvPr id="110" name="Google Shape;110;p22"/>
+          <p:cNvSpPr txBox="1"/>
+          <p:nvPr>
+            <p:ph idx="1" type="body"/>
+          </p:nvPr>
+        </p:nvSpPr>
+        <p:spPr>
+          <a:xfrm>
+            <a:off x="311700" y="1152475"/>
+            <a:ext cx="8520600" cy="3416400"/>
+          </a:xfrm>
+          <a:prstGeom prst="rect">
+            <a:avLst/>
+          </a:prstGeom>
+        </p:spPr>
+        <p:txBody>
+          <a:bodyPr anchorCtr="0" anchor="t" bIns="91425" lIns="91425" spcFirstLastPara="1" rIns="91425" wrap="square" tIns="91425">
+            <a:normAutofit/>
+          </a:bodyPr>
+          <a:lstStyle/>
+          <a:p>
+            <a:pPr indent="-342900" lvl="0" marL="457200" rtl="0" algn="l">
+              <a:spcBef>
+                <a:spcPts val="0"/>
+              </a:spcBef>
+              <a:spcAft>
+                <a:spcPts val="0"/>
+              </a:spcAft>
+              <a:buSzPts val="1800"/>
+              <a:buAutoNum type="arabicPeriod"/>
+            </a:pPr>
+            <a:r>
+              <a:rPr b="1" lang="en-GB"/>
+              <a:t>Thingsboard </a:t>
+            </a:r>
+            <a:r>
+              <a:rPr lang="en-GB"/>
+              <a:t>to </a:t>
+            </a:r>
+            <a:r>
+              <a:rPr b="1" lang="en-GB"/>
+              <a:t>Laptop </a:t>
+            </a:r>
+            <a:r>
+              <a:rPr lang="en-GB"/>
+              <a:t>-</a:t>
+            </a:r>
+            <a:r>
+              <a:rPr b="1" lang="en-GB"/>
+              <a:t> MQTT</a:t>
+            </a:r>
+            <a:endParaRPr b="1"/>
+          </a:p>
+          <a:p>
+            <a:pPr indent="-342900" lvl="0" marL="457200" rtl="0" algn="l">
+              <a:spcBef>
+                <a:spcPts val="0"/>
+              </a:spcBef>
+              <a:spcAft>
+                <a:spcPts val="0"/>
+              </a:spcAft>
+              <a:buSzPts val="1800"/>
+              <a:buAutoNum type="arabicPeriod"/>
+            </a:pPr>
+            <a:r>
+              <a:rPr b="1" lang="en-GB"/>
+              <a:t>Laptop </a:t>
+            </a:r>
+            <a:r>
+              <a:rPr lang="en-GB"/>
+              <a:t>to</a:t>
+            </a:r>
+            <a:r>
+              <a:rPr b="1" lang="en-GB"/>
+              <a:t> Thingsboard </a:t>
+            </a:r>
+            <a:r>
+              <a:rPr lang="en-GB"/>
+              <a:t>- </a:t>
+            </a:r>
+            <a:r>
+              <a:rPr b="1" lang="en-GB"/>
+              <a:t>CoAP</a:t>
+            </a:r>
+            <a:endParaRPr b="1"/>
+          </a:p>
+          <a:p>
+            <a:pPr indent="-342900" lvl="0" marL="457200" rtl="0" algn="l">
+              <a:spcBef>
+                <a:spcPts val="0"/>
+              </a:spcBef>
+              <a:spcAft>
+                <a:spcPts val="0"/>
+              </a:spcAft>
+              <a:buSzPts val="1800"/>
+              <a:buAutoNum type="arabicPeriod"/>
+            </a:pPr>
+            <a:r>
+              <a:rPr b="1" lang="en-GB"/>
+              <a:t>Laptop </a:t>
+            </a:r>
+            <a:r>
+              <a:rPr lang="en-GB"/>
+              <a:t>to</a:t>
+            </a:r>
+            <a:r>
+              <a:rPr b="1" lang="en-GB"/>
+              <a:t> ESP32 </a:t>
+            </a:r>
+            <a:r>
+              <a:rPr lang="en-GB"/>
+              <a:t>- </a:t>
+            </a:r>
+            <a:r>
+              <a:rPr b="1" lang="en-GB"/>
+              <a:t>BLE</a:t>
+            </a:r>
+            <a:endParaRPr b="1"/>
+          </a:p>
+          <a:p>
+            <a:pPr indent="-342900" lvl="0" marL="457200" rtl="0" algn="l">
+              <a:spcBef>
+                <a:spcPts val="0"/>
+              </a:spcBef>
+              <a:spcAft>
+                <a:spcPts val="0"/>
+              </a:spcAft>
+              <a:buSzPts val="1800"/>
+              <a:buAutoNum type="arabicPeriod"/>
+            </a:pPr>
+            <a:r>
+              <a:rPr b="1" lang="en-GB"/>
+              <a:t>ESP32 </a:t>
+            </a:r>
+            <a:r>
+              <a:rPr lang="en-GB"/>
+              <a:t>to </a:t>
+            </a:r>
+            <a:r>
+              <a:rPr b="1" lang="en-GB"/>
+              <a:t>Laptop </a:t>
+            </a:r>
+            <a:r>
+              <a:rPr lang="en-GB"/>
+              <a:t>- </a:t>
+            </a:r>
+            <a:r>
+              <a:rPr b="1" lang="en-GB"/>
+              <a:t>BLE</a:t>
+            </a:r>
+            <a:endParaRPr b="1"/>
+          </a:p>
+          <a:p>
+            <a:pPr indent="-342900" lvl="0" marL="457200" rtl="0" algn="l">
+              <a:spcBef>
+                <a:spcPts val="0"/>
+              </a:spcBef>
+              <a:spcAft>
+                <a:spcPts val="0"/>
+              </a:spcAft>
+              <a:buSzPts val="1800"/>
+              <a:buAutoNum type="arabicPeriod"/>
+            </a:pPr>
+            <a:r>
+              <a:rPr b="1" lang="en-GB"/>
+              <a:t>ESP32 </a:t>
+            </a:r>
+            <a:r>
+              <a:rPr lang="en-GB"/>
+              <a:t>to</a:t>
+            </a:r>
+            <a:r>
+              <a:rPr b="1" lang="en-GB"/>
+              <a:t> Firebird 5 </a:t>
+            </a:r>
+            <a:r>
+              <a:rPr lang="en-GB"/>
+              <a:t>-</a:t>
+            </a:r>
+            <a:r>
+              <a:rPr b="1" lang="en-GB"/>
+              <a:t> UART</a:t>
+            </a:r>
+            <a:endParaRPr/>
+          </a:p>
+          <a:p>
+            <a:pPr indent="-342900" lvl="0" marL="457200" rtl="0" algn="l">
+              <a:spcBef>
+                <a:spcPts val="0"/>
+              </a:spcBef>
+              <a:spcAft>
+                <a:spcPts val="0"/>
+              </a:spcAft>
+              <a:buSzPts val="1800"/>
+              <a:buAutoNum type="arabicPeriod"/>
+            </a:pPr>
+            <a:r>
+              <a:rPr b="1" lang="en-GB"/>
+              <a:t>Firebird 5 </a:t>
+            </a:r>
+            <a:r>
+              <a:rPr lang="en-GB"/>
+              <a:t>to</a:t>
+            </a:r>
+            <a:r>
+              <a:rPr b="1" lang="en-GB"/>
+              <a:t> ESP32 </a:t>
+            </a:r>
+            <a:r>
+              <a:rPr lang="en-GB"/>
+              <a:t>-</a:t>
+            </a:r>
+            <a:r>
+              <a:rPr b="1" lang="en-GB"/>
+              <a:t> UART</a:t>
+            </a:r>
+            <a:endParaRPr b="1"/>
+          </a:p>
+        </p:txBody>
+      </p:sp>
+    </p:spTree>
+  </p:cSld>
+  <p:clrMapOvr>
+    <a:masterClrMapping/>
+  </p:clrMapOvr>
+</p:sld>
+</file>
+
+<file path=ppt/slides/slide11.xml><?xml version="1.0" encoding="utf-8"?>
+<p:sld xmlns:a="http://schemas.openxmlformats.org/drawingml/2006/main" xmlns:r="http://schemas.openxmlformats.org/officeDocument/2006/relationships" xmlns:mc="http://schemas.openxmlformats.org/markup-compatibility/2006" xmlns:mv="urn:schemas-microsoft-com:mac:vml" xmlns:p="http://schemas.openxmlformats.org/presentationml/2006/main" xmlns:c="http://schemas.openxmlformats.org/drawingml/2006/chart" xmlns:dgm="http://schemas.openxmlformats.org/drawingml/2006/diagram" xmlns:o="urn:schemas-microsoft-com:office:office" xmlns:v="urn:schemas-microsoft-com:vml" xmlns:pvml="urn:schemas-microsoft-com:office:powerpoint" xmlns:com="http://schemas.openxmlformats.org/drawingml/2006/compatibility" xmlns:p14="http://schemas.microsoft.com/office/powerpoint/2010/main" xmlns:p15="http://schemas.microsoft.com/office/powerpoint/2012/main" xmlns:ahyp="http://schemas.microsoft.com/office/drawing/2018/hyperlinkcolor">
+  <p:cSld>
+    <p:spTree>
+      <p:nvGrpSpPr>
+        <p:cNvPr id="114" name="Shape 114"/>
+        <p:cNvGrpSpPr/>
+        <p:nvPr/>
+      </p:nvGrpSpPr>
+      <p:grpSpPr>
+        <a:xfrm>
+          <a:off x="0" y="0"/>
+          <a:ext cx="0" cy="0"/>
+          <a:chOff x="0" y="0"/>
+          <a:chExt cx="0" cy="0"/>
+        </a:xfrm>
+      </p:grpSpPr>
+      <p:sp>
+        <p:nvSpPr>
+          <p:cNvPr id="115" name="Google Shape;115;p23"/>
+          <p:cNvSpPr txBox="1"/>
+          <p:nvPr>
+            <p:ph type="title"/>
+          </p:nvPr>
+        </p:nvSpPr>
+        <p:spPr>
+          <a:xfrm>
+            <a:off x="311700" y="445025"/>
+            <a:ext cx="8520600" cy="572700"/>
+          </a:xfrm>
+          <a:prstGeom prst="rect">
+            <a:avLst/>
+          </a:prstGeom>
+        </p:spPr>
+        <p:txBody>
+          <a:bodyPr anchorCtr="0" anchor="t" bIns="91425" lIns="91425" spcFirstLastPara="1" rIns="91425" wrap="square" tIns="91425">
+            <a:normAutofit fontScale="90000"/>
+          </a:bodyPr>
+          <a:lstStyle/>
+          <a:p>
+            <a:pPr indent="0" lvl="0" marL="0" rtl="0" algn="l">
+              <a:spcBef>
+                <a:spcPts val="0"/>
+              </a:spcBef>
+              <a:spcAft>
+                <a:spcPts val="0"/>
+              </a:spcAft>
+              <a:buNone/>
+            </a:pPr>
+            <a:r>
+              <a:rPr lang="en-GB"/>
+              <a:t>Data Formats</a:t>
+            </a:r>
+            <a:endParaRPr/>
+          </a:p>
+        </p:txBody>
+      </p:sp>
+      <p:sp>
+        <p:nvSpPr>
+          <p:cNvPr id="116" name="Google Shape;116;p23"/>
+          <p:cNvSpPr txBox="1"/>
+          <p:nvPr>
+            <p:ph idx="1" type="body"/>
+          </p:nvPr>
+        </p:nvSpPr>
+        <p:spPr>
+          <a:xfrm>
+            <a:off x="311700" y="1152475"/>
+            <a:ext cx="8520600" cy="3416400"/>
+          </a:xfrm>
+          <a:prstGeom prst="rect">
+            <a:avLst/>
+          </a:prstGeom>
+        </p:spPr>
+        <p:txBody>
+          <a:bodyPr anchorCtr="0" anchor="t" bIns="91425" lIns="91425" spcFirstLastPara="1" rIns="91425" wrap="square" tIns="91425">
+            <a:normAutofit/>
+          </a:bodyPr>
+          <a:lstStyle/>
+          <a:p>
+            <a:pPr indent="-342900" lvl="0" marL="457200" rtl="0" algn="l">
+              <a:spcBef>
+                <a:spcPts val="0"/>
+              </a:spcBef>
+              <a:spcAft>
+                <a:spcPts val="0"/>
+              </a:spcAft>
+              <a:buSzPts val="1800"/>
+              <a:buAutoNum type="arabicPeriod"/>
+            </a:pPr>
+            <a:r>
+              <a:rPr b="1" lang="en-GB"/>
+              <a:t>Thingsboard </a:t>
+            </a:r>
+            <a:r>
+              <a:rPr lang="en-GB"/>
+              <a:t>to </a:t>
+            </a:r>
+            <a:r>
+              <a:rPr b="1" lang="en-GB"/>
+              <a:t>Laptop </a:t>
+            </a:r>
+            <a:r>
+              <a:rPr lang="en-GB"/>
+              <a:t>-</a:t>
+            </a:r>
+            <a:r>
+              <a:rPr b="1" lang="en-GB"/>
+              <a:t> JSON (as specified in the next slides)</a:t>
+            </a:r>
+            <a:endParaRPr b="1"/>
+          </a:p>
+          <a:p>
+            <a:pPr indent="-342900" lvl="0" marL="457200" rtl="0" algn="l">
+              <a:spcBef>
+                <a:spcPts val="0"/>
+              </a:spcBef>
+              <a:spcAft>
+                <a:spcPts val="0"/>
+              </a:spcAft>
+              <a:buSzPts val="1800"/>
+              <a:buAutoNum type="arabicPeriod"/>
+            </a:pPr>
+            <a:r>
+              <a:rPr b="1" lang="en-GB"/>
+              <a:t>Laptop </a:t>
+            </a:r>
+            <a:r>
+              <a:rPr lang="en-GB"/>
+              <a:t>to</a:t>
+            </a:r>
+            <a:r>
+              <a:rPr b="1" lang="en-GB"/>
+              <a:t> Thingsboard </a:t>
+            </a:r>
+            <a:r>
+              <a:rPr lang="en-GB"/>
+              <a:t>- </a:t>
+            </a:r>
+            <a:r>
+              <a:rPr b="1" lang="en-GB"/>
+              <a:t>JSON (as specified in the next slides)</a:t>
+            </a:r>
+            <a:endParaRPr b="1"/>
+          </a:p>
+          <a:p>
+            <a:pPr indent="-342900" lvl="0" marL="457200" rtl="0" algn="l">
+              <a:spcBef>
+                <a:spcPts val="0"/>
+              </a:spcBef>
+              <a:spcAft>
+                <a:spcPts val="0"/>
+              </a:spcAft>
+              <a:buSzPts val="1800"/>
+              <a:buAutoNum type="arabicPeriod"/>
+            </a:pPr>
+            <a:r>
+              <a:rPr b="1" lang="en-GB"/>
+              <a:t>Laptop </a:t>
+            </a:r>
+            <a:r>
+              <a:rPr lang="en-GB"/>
+              <a:t>to</a:t>
+            </a:r>
+            <a:r>
+              <a:rPr b="1" lang="en-GB"/>
+              <a:t> ESP32 </a:t>
+            </a:r>
+            <a:r>
+              <a:rPr lang="en-GB"/>
+              <a:t>- </a:t>
+            </a:r>
+            <a:r>
+              <a:rPr b="1" lang="en-GB"/>
+              <a:t>Any</a:t>
+            </a:r>
+            <a:endParaRPr b="1"/>
+          </a:p>
+          <a:p>
+            <a:pPr indent="-342900" lvl="0" marL="457200" rtl="0" algn="l">
+              <a:spcBef>
+                <a:spcPts val="0"/>
+              </a:spcBef>
+              <a:spcAft>
+                <a:spcPts val="0"/>
+              </a:spcAft>
+              <a:buSzPts val="1800"/>
+              <a:buAutoNum type="arabicPeriod"/>
+            </a:pPr>
+            <a:r>
+              <a:rPr b="1" lang="en-GB"/>
+              <a:t>ESP32 </a:t>
+            </a:r>
+            <a:r>
+              <a:rPr lang="en-GB"/>
+              <a:t>to </a:t>
+            </a:r>
+            <a:r>
+              <a:rPr b="1" lang="en-GB"/>
+              <a:t>Laptop </a:t>
+            </a:r>
+            <a:r>
+              <a:rPr lang="en-GB"/>
+              <a:t>- </a:t>
+            </a:r>
+            <a:r>
+              <a:rPr b="1" lang="en-GB"/>
+              <a:t>Any</a:t>
+            </a:r>
+            <a:endParaRPr b="1"/>
+          </a:p>
+          <a:p>
+            <a:pPr indent="-342900" lvl="0" marL="457200" rtl="0" algn="l">
+              <a:spcBef>
+                <a:spcPts val="0"/>
+              </a:spcBef>
+              <a:spcAft>
+                <a:spcPts val="0"/>
+              </a:spcAft>
+              <a:buSzPts val="1800"/>
+              <a:buAutoNum type="arabicPeriod"/>
+            </a:pPr>
+            <a:r>
+              <a:rPr b="1" lang="en-GB"/>
+              <a:t>ESP32 </a:t>
+            </a:r>
+            <a:r>
+              <a:rPr lang="en-GB"/>
+              <a:t>to</a:t>
+            </a:r>
+            <a:r>
+              <a:rPr b="1" lang="en-GB"/>
+              <a:t> Firebird 5 </a:t>
+            </a:r>
+            <a:r>
+              <a:rPr lang="en-GB"/>
+              <a:t>-</a:t>
+            </a:r>
+            <a:r>
+              <a:rPr b="1" lang="en-GB"/>
+              <a:t> Any</a:t>
+            </a:r>
+            <a:endParaRPr/>
+          </a:p>
+          <a:p>
+            <a:pPr indent="-342900" lvl="0" marL="457200" rtl="0" algn="l">
+              <a:spcBef>
+                <a:spcPts val="0"/>
+              </a:spcBef>
+              <a:spcAft>
+                <a:spcPts val="0"/>
+              </a:spcAft>
+              <a:buSzPts val="1800"/>
+              <a:buAutoNum type="arabicPeriod"/>
+            </a:pPr>
+            <a:r>
+              <a:rPr b="1" lang="en-GB"/>
+              <a:t>Firebird 5 </a:t>
+            </a:r>
+            <a:r>
+              <a:rPr lang="en-GB"/>
+              <a:t>to</a:t>
+            </a:r>
+            <a:r>
+              <a:rPr b="1" lang="en-GB"/>
+              <a:t> ESP32 </a:t>
+            </a:r>
+            <a:r>
+              <a:rPr lang="en-GB"/>
+              <a:t>-</a:t>
+            </a:r>
+            <a:r>
+              <a:rPr b="1" lang="en-GB"/>
+              <a:t> Any</a:t>
+            </a:r>
+            <a:endParaRPr/>
+          </a:p>
+        </p:txBody>
+      </p:sp>
+    </p:spTree>
+  </p:cSld>
+  <p:clrMapOvr>
+    <a:masterClrMapping/>
+  </p:clrMapOvr>
+</p:sld>
+</file>
+
+<file path=ppt/slides/slide12.xml><?xml version="1.0" encoding="utf-8"?>
+<p:sld xmlns:a="http://schemas.openxmlformats.org/drawingml/2006/main" xmlns:r="http://schemas.openxmlformats.org/officeDocument/2006/relationships" xmlns:mc="http://schemas.openxmlformats.org/markup-compatibility/2006" xmlns:mv="urn:schemas-microsoft-com:mac:vml" xmlns:p="http://schemas.openxmlformats.org/presentationml/2006/main" xmlns:c="http://schemas.openxmlformats.org/drawingml/2006/chart" xmlns:dgm="http://schemas.openxmlformats.org/drawingml/2006/diagram" xmlns:o="urn:schemas-microsoft-com:office:office" xmlns:v="urn:schemas-microsoft-com:vml" xmlns:pvml="urn:schemas-microsoft-com:office:powerpoint" xmlns:com="http://schemas.openxmlformats.org/drawingml/2006/compatibility" xmlns:p14="http://schemas.microsoft.com/office/powerpoint/2010/main" xmlns:p15="http://schemas.microsoft.com/office/powerpoint/2012/main" xmlns:ahyp="http://schemas.microsoft.com/office/drawing/2018/hyperlinkcolor">
+  <p:cSld>
+    <p:spTree>
+      <p:nvGrpSpPr>
+        <p:cNvPr id="120" name="Shape 120"/>
+        <p:cNvGrpSpPr/>
+        <p:nvPr/>
+      </p:nvGrpSpPr>
+      <p:grpSpPr>
+        <a:xfrm>
+          <a:off x="0" y="0"/>
+          <a:ext cx="0" cy="0"/>
+          <a:chOff x="0" y="0"/>
+          <a:chExt cx="0" cy="0"/>
+        </a:xfrm>
+      </p:grpSpPr>
+      <p:sp>
+        <p:nvSpPr>
+          <p:cNvPr id="121" name="Google Shape;121;p24"/>
+          <p:cNvSpPr txBox="1"/>
+          <p:nvPr>
+            <p:ph type="title"/>
+          </p:nvPr>
+        </p:nvSpPr>
+        <p:spPr>
+          <a:xfrm>
+            <a:off x="311700" y="445025"/>
+            <a:ext cx="8520600" cy="572700"/>
+          </a:xfrm>
+          <a:prstGeom prst="rect">
+            <a:avLst/>
+          </a:prstGeom>
+        </p:spPr>
+        <p:txBody>
+          <a:bodyPr anchorCtr="0" anchor="t" bIns="91425" lIns="91425" spcFirstLastPara="1" rIns="91425" wrap="square" tIns="91425">
+            <a:normAutofit fontScale="90000"/>
+          </a:bodyPr>
+          <a:lstStyle/>
+          <a:p>
+            <a:pPr indent="0" lvl="0" marL="0" rtl="0" algn="l">
+              <a:spcBef>
+                <a:spcPts val="0"/>
+              </a:spcBef>
+              <a:spcAft>
+                <a:spcPts val="0"/>
+              </a:spcAft>
+              <a:buNone/>
+            </a:pPr>
+            <a:r>
+              <a:rPr lang="en-GB"/>
+              <a:t>Server Requests</a:t>
+            </a:r>
+            <a:endParaRPr/>
+          </a:p>
+        </p:txBody>
+      </p:sp>
+      <p:sp>
+        <p:nvSpPr>
+          <p:cNvPr id="122" name="Google Shape;122;p24"/>
+          <p:cNvSpPr txBox="1"/>
+          <p:nvPr>
+            <p:ph idx="1" type="body"/>
+          </p:nvPr>
+        </p:nvSpPr>
+        <p:spPr>
+          <a:xfrm>
+            <a:off x="311700" y="1152475"/>
+            <a:ext cx="8520600" cy="3416400"/>
+          </a:xfrm>
+          <a:prstGeom prst="rect">
+            <a:avLst/>
+          </a:prstGeom>
+        </p:spPr>
+        <p:txBody>
+          <a:bodyPr anchorCtr="0" anchor="t" bIns="91425" lIns="91425" spcFirstLastPara="1" rIns="91425" wrap="square" tIns="91425">
+            <a:normAutofit/>
+          </a:bodyPr>
+          <a:lstStyle/>
+          <a:p>
+            <a:pPr indent="-342900" lvl="0" marL="457200" rtl="0" algn="l">
+              <a:spcBef>
+                <a:spcPts val="0"/>
+              </a:spcBef>
+              <a:spcAft>
+                <a:spcPts val="0"/>
+              </a:spcAft>
+              <a:buSzPts val="1800"/>
+              <a:buAutoNum type="arabicPeriod"/>
+            </a:pPr>
+            <a:r>
+              <a:rPr lang="en-GB"/>
+              <a:t>Requests are of two types: </a:t>
+            </a:r>
+            <a:r>
+              <a:rPr b="1" lang="en-GB"/>
+              <a:t>Fetch Nearest</a:t>
+            </a:r>
+            <a:r>
+              <a:rPr lang="en-GB"/>
+              <a:t> and </a:t>
+            </a:r>
+            <a:r>
+              <a:rPr b="1" lang="en-GB"/>
+              <a:t>Scan</a:t>
+            </a:r>
+            <a:r>
+              <a:rPr lang="en-GB"/>
+              <a:t>.</a:t>
+            </a:r>
+            <a:endParaRPr/>
+          </a:p>
+          <a:p>
+            <a:pPr indent="-342900" lvl="0" marL="457200" rtl="0" algn="l">
+              <a:spcBef>
+                <a:spcPts val="0"/>
+              </a:spcBef>
+              <a:spcAft>
+                <a:spcPts val="0"/>
+              </a:spcAft>
+              <a:buSzPts val="1800"/>
+              <a:buAutoNum type="arabicPeriod"/>
+            </a:pPr>
+            <a:r>
+              <a:rPr b="1" lang="en-GB"/>
+              <a:t>Fetch Nearest </a:t>
+            </a:r>
+            <a:r>
+              <a:rPr lang="en-GB"/>
+              <a:t>request demands reaching the nearest specified injury location and beep the buzzer. Convey the result to the thingsboard after </a:t>
+            </a:r>
+            <a:r>
+              <a:rPr b="1" lang="en-GB"/>
+              <a:t>reaching and beeping at the location</a:t>
+            </a:r>
+            <a:r>
+              <a:rPr lang="en-GB"/>
+              <a:t>. </a:t>
+            </a:r>
+            <a:endParaRPr/>
+          </a:p>
+          <a:p>
+            <a:pPr indent="-342900" lvl="0" marL="457200" rtl="0" algn="l">
+              <a:spcBef>
+                <a:spcPts val="0"/>
+              </a:spcBef>
+              <a:spcAft>
+                <a:spcPts val="0"/>
+              </a:spcAft>
+              <a:buSzPts val="1800"/>
+              <a:buAutoNum type="arabicPeriod"/>
+            </a:pPr>
+            <a:r>
+              <a:rPr b="1" lang="en-GB"/>
+              <a:t>Scan </a:t>
+            </a:r>
+            <a:r>
+              <a:rPr lang="en-GB"/>
+              <a:t>request demands scanning a particular </a:t>
+            </a:r>
+            <a:r>
+              <a:rPr b="1" lang="en-GB"/>
+              <a:t>plot</a:t>
+            </a:r>
+            <a:r>
+              <a:rPr lang="en-GB"/>
+              <a:t>. Convey the result to the thingsboard after </a:t>
+            </a:r>
+            <a:r>
+              <a:rPr b="1" lang="en-GB"/>
+              <a:t>reaching, identifying and beeping at the location</a:t>
+            </a:r>
+            <a:r>
+              <a:rPr lang="en-GB"/>
+              <a:t>.</a:t>
+            </a:r>
+            <a:endParaRPr/>
+          </a:p>
+          <a:p>
+            <a:pPr indent="-342900" lvl="0" marL="457200" rtl="0" algn="l">
+              <a:spcBef>
+                <a:spcPts val="0"/>
+              </a:spcBef>
+              <a:spcAft>
+                <a:spcPts val="0"/>
+              </a:spcAft>
+              <a:buSzPts val="1800"/>
+              <a:buAutoNum type="arabicPeriod"/>
+            </a:pPr>
+            <a:r>
+              <a:rPr b="1" lang="en-GB"/>
+              <a:t>The request should be completed in stipulated time also provided in the request (completeIn).</a:t>
+            </a:r>
+            <a:endParaRPr b="1"/>
+          </a:p>
+          <a:p>
+            <a:pPr indent="-342900" lvl="0" marL="457200" rtl="0" algn="l">
+              <a:spcBef>
+                <a:spcPts val="0"/>
+              </a:spcBef>
+              <a:spcAft>
+                <a:spcPts val="0"/>
+              </a:spcAft>
+              <a:buSzPts val="1800"/>
+              <a:buAutoNum type="arabicPeriod"/>
+            </a:pPr>
+            <a:r>
+              <a:rPr b="1" lang="en-GB"/>
+              <a:t>The result should also contain the time taken by the robot to complete the request.</a:t>
+            </a:r>
+            <a:endParaRPr b="1"/>
+          </a:p>
+        </p:txBody>
+      </p:sp>
+    </p:spTree>
+  </p:cSld>
+  <p:clrMapOvr>
+    <a:masterClrMapping/>
+  </p:clrMapOvr>
+</p:sld>
+</file>
+
+<file path=ppt/slides/slide13.xml><?xml version="1.0" encoding="utf-8"?>
+<p:sld xmlns:a="http://schemas.openxmlformats.org/drawingml/2006/main" xmlns:r="http://schemas.openxmlformats.org/officeDocument/2006/relationships" xmlns:mc="http://schemas.openxmlformats.org/markup-compatibility/2006" xmlns:mv="urn:schemas-microsoft-com:mac:vml" xmlns:p="http://schemas.openxmlformats.org/presentationml/2006/main" xmlns:c="http://schemas.openxmlformats.org/drawingml/2006/chart" xmlns:dgm="http://schemas.openxmlformats.org/drawingml/2006/diagram" xmlns:o="urn:schemas-microsoft-com:office:office" xmlns:v="urn:schemas-microsoft-com:vml" xmlns:pvml="urn:schemas-microsoft-com:office:powerpoint" xmlns:com="http://schemas.openxmlformats.org/drawingml/2006/compatibility" xmlns:p14="http://schemas.microsoft.com/office/powerpoint/2010/main" xmlns:p15="http://schemas.microsoft.com/office/powerpoint/2012/main" xmlns:ahyp="http://schemas.microsoft.com/office/drawing/2018/hyperlinkcolor">
+  <p:cSld>
+    <p:spTree>
+      <p:nvGrpSpPr>
+        <p:cNvPr id="126" name="Shape 126"/>
+        <p:cNvGrpSpPr/>
+        <p:nvPr/>
+      </p:nvGrpSpPr>
+      <p:grpSpPr>
+        <a:xfrm>
+          <a:off x="0" y="0"/>
+          <a:ext cx="0" cy="0"/>
+          <a:chOff x="0" y="0"/>
+          <a:chExt cx="0" cy="0"/>
+        </a:xfrm>
+      </p:grpSpPr>
+      <p:sp>
+        <p:nvSpPr>
+          <p:cNvPr id="127" name="Google Shape;127;p25"/>
+          <p:cNvSpPr txBox="1"/>
+          <p:nvPr>
+            <p:ph type="title"/>
+          </p:nvPr>
+        </p:nvSpPr>
+        <p:spPr>
+          <a:xfrm>
+            <a:off x="311700" y="445025"/>
+            <a:ext cx="8520600" cy="572700"/>
+          </a:xfrm>
+          <a:prstGeom prst="rect">
+            <a:avLst/>
+          </a:prstGeom>
+        </p:spPr>
+        <p:txBody>
+          <a:bodyPr anchorCtr="0" anchor="t" bIns="91425" lIns="91425" spcFirstLastPara="1" rIns="91425" wrap="square" tIns="91425">
+            <a:normAutofit fontScale="90000"/>
+          </a:bodyPr>
+          <a:lstStyle/>
+          <a:p>
+            <a:pPr indent="0" lvl="0" marL="0" rtl="0" algn="l">
+              <a:spcBef>
+                <a:spcPts val="0"/>
+              </a:spcBef>
+              <a:spcAft>
+                <a:spcPts val="0"/>
+              </a:spcAft>
+              <a:buNone/>
+            </a:pPr>
+            <a:r>
+              <a:rPr lang="en-GB"/>
+              <a:t>Fetch Nearest - Request</a:t>
+            </a:r>
+            <a:endParaRPr/>
+          </a:p>
+        </p:txBody>
+      </p:sp>
+      <p:sp>
+        <p:nvSpPr>
+          <p:cNvPr id="128" name="Google Shape;128;p25"/>
+          <p:cNvSpPr txBox="1"/>
+          <p:nvPr>
+            <p:ph idx="1" type="body"/>
+          </p:nvPr>
+        </p:nvSpPr>
+        <p:spPr>
+          <a:xfrm>
+            <a:off x="311700" y="1152475"/>
+            <a:ext cx="8520600" cy="3416400"/>
+          </a:xfrm>
+          <a:prstGeom prst="rect">
+            <a:avLst/>
+          </a:prstGeom>
+        </p:spPr>
+        <p:txBody>
+          <a:bodyPr anchorCtr="0" anchor="t" bIns="91425" lIns="91425" spcFirstLastPara="1" rIns="91425" wrap="square" tIns="91425">
+            <a:normAutofit fontScale="70000" lnSpcReduction="20000"/>
+          </a:bodyPr>
+          <a:lstStyle/>
+          <a:p>
+            <a:pPr indent="0" lvl="0" marL="0" rtl="0" algn="l">
+              <a:spcBef>
+                <a:spcPts val="0"/>
+              </a:spcBef>
+              <a:spcAft>
+                <a:spcPts val="0"/>
+              </a:spcAft>
+              <a:buNone/>
+            </a:pPr>
+            <a:r>
+              <a:rPr lang="en-GB"/>
+              <a:t>{</a:t>
+            </a:r>
+            <a:endParaRPr/>
+          </a:p>
+          <a:p>
+            <a:pPr indent="0" lvl="0" marL="0" rtl="0" algn="l">
+              <a:spcBef>
+                <a:spcPts val="1200"/>
+              </a:spcBef>
+              <a:spcAft>
+                <a:spcPts val="0"/>
+              </a:spcAft>
+              <a:buNone/>
+            </a:pPr>
+            <a:r>
+              <a:rPr lang="en-GB"/>
+              <a:t>        "method": "fetchNearest",</a:t>
+            </a:r>
+            <a:endParaRPr/>
+          </a:p>
+          <a:p>
+            <a:pPr indent="0" lvl="0" marL="0" rtl="0" algn="l">
+              <a:spcBef>
+                <a:spcPts val="1200"/>
+              </a:spcBef>
+              <a:spcAft>
+                <a:spcPts val="0"/>
+              </a:spcAft>
+              <a:buNone/>
+            </a:pPr>
+            <a:r>
+              <a:rPr lang="en-GB"/>
+              <a:t>        "params": {</a:t>
+            </a:r>
+            <a:endParaRPr/>
+          </a:p>
+          <a:p>
+            <a:pPr indent="0" lvl="0" marL="0" rtl="0" algn="l">
+              <a:spcBef>
+                <a:spcPts val="1200"/>
+              </a:spcBef>
+              <a:spcAft>
+                <a:spcPts val="0"/>
+              </a:spcAft>
+              <a:buNone/>
+            </a:pPr>
+            <a:r>
+              <a:rPr lang="en-GB"/>
+              <a:t>            "type": "majorInjury",</a:t>
+            </a:r>
+            <a:endParaRPr/>
+          </a:p>
+          <a:p>
+            <a:pPr indent="0" lvl="0" marL="0" rtl="0" algn="l">
+              <a:spcBef>
+                <a:spcPts val="1200"/>
+              </a:spcBef>
+              <a:spcAft>
+                <a:spcPts val="0"/>
+              </a:spcAft>
+              <a:buNone/>
+            </a:pPr>
+            <a:r>
+              <a:rPr lang="en-GB"/>
+              <a:t>            "id": 2415498415,</a:t>
+            </a:r>
+            <a:endParaRPr/>
+          </a:p>
+          <a:p>
+            <a:pPr indent="0" lvl="0" marL="0" rtl="0" algn="l">
+              <a:spcBef>
+                <a:spcPts val="1200"/>
+              </a:spcBef>
+              <a:spcAft>
+                <a:spcPts val="0"/>
+              </a:spcAft>
+              <a:buNone/>
+            </a:pPr>
+            <a:r>
+              <a:rPr lang="en-GB"/>
+              <a:t>            "serverTime": 1616352000,</a:t>
+            </a:r>
+            <a:endParaRPr/>
+          </a:p>
+          <a:p>
+            <a:pPr indent="0" lvl="0" marL="0" rtl="0" algn="l">
+              <a:spcBef>
+                <a:spcPts val="1200"/>
+              </a:spcBef>
+              <a:spcAft>
+                <a:spcPts val="0"/>
+              </a:spcAft>
+              <a:buNone/>
+            </a:pPr>
+            <a:r>
+              <a:rPr lang="en-GB"/>
+              <a:t>            "completeIn": 10</a:t>
+            </a:r>
+            <a:endParaRPr/>
+          </a:p>
+          <a:p>
+            <a:pPr indent="0" lvl="0" marL="0" rtl="0" algn="l">
+              <a:spcBef>
+                <a:spcPts val="1200"/>
+              </a:spcBef>
+              <a:spcAft>
+                <a:spcPts val="0"/>
+              </a:spcAft>
+              <a:buNone/>
+            </a:pPr>
+            <a:r>
+              <a:rPr lang="en-GB"/>
+              <a:t>        }</a:t>
+            </a:r>
+            <a:endParaRPr/>
+          </a:p>
+          <a:p>
+            <a:pPr indent="0" lvl="0" marL="0" rtl="0" algn="l">
+              <a:spcBef>
+                <a:spcPts val="1200"/>
+              </a:spcBef>
+              <a:spcAft>
+                <a:spcPts val="0"/>
+              </a:spcAft>
+              <a:buNone/>
+            </a:pPr>
+            <a:r>
+              <a:rPr lang="en-GB"/>
+              <a:t>}</a:t>
+            </a:r>
+            <a:endParaRPr/>
+          </a:p>
+          <a:p>
+            <a:pPr indent="0" lvl="0" marL="0" rtl="0" algn="l">
+              <a:spcBef>
+                <a:spcPts val="1200"/>
+              </a:spcBef>
+              <a:spcAft>
+                <a:spcPts val="1200"/>
+              </a:spcAft>
+              <a:buNone/>
+            </a:pPr>
+            <a:r>
+              <a:t/>
+            </a:r>
+            <a:endParaRPr/>
+          </a:p>
+        </p:txBody>
+      </p:sp>
+    </p:spTree>
+  </p:cSld>
+  <p:clrMapOvr>
+    <a:masterClrMapping/>
+  </p:clrMapOvr>
+</p:sld>
+</file>
+
+<file path=ppt/slides/slide14.xml><?xml version="1.0" encoding="utf-8"?>
+<p:sld xmlns:a="http://schemas.openxmlformats.org/drawingml/2006/main" xmlns:r="http://schemas.openxmlformats.org/officeDocument/2006/relationships" xmlns:mc="http://schemas.openxmlformats.org/markup-compatibility/2006" xmlns:mv="urn:schemas-microsoft-com:mac:vml" xmlns:p="http://schemas.openxmlformats.org/presentationml/2006/main" xmlns:c="http://schemas.openxmlformats.org/drawingml/2006/chart" xmlns:dgm="http://schemas.openxmlformats.org/drawingml/2006/diagram" xmlns:o="urn:schemas-microsoft-com:office:office" xmlns:v="urn:schemas-microsoft-com:vml" xmlns:pvml="urn:schemas-microsoft-com:office:powerpoint" xmlns:com="http://schemas.openxmlformats.org/drawingml/2006/compatibility" xmlns:p14="http://schemas.microsoft.com/office/powerpoint/2010/main" xmlns:p15="http://schemas.microsoft.com/office/powerpoint/2012/main" xmlns:ahyp="http://schemas.microsoft.com/office/drawing/2018/hyperlinkcolor">
+  <p:cSld>
+    <p:spTree>
+      <p:nvGrpSpPr>
+        <p:cNvPr id="132" name="Shape 132"/>
+        <p:cNvGrpSpPr/>
+        <p:nvPr/>
+      </p:nvGrpSpPr>
+      <p:grpSpPr>
+        <a:xfrm>
+          <a:off x="0" y="0"/>
+          <a:ext cx="0" cy="0"/>
+          <a:chOff x="0" y="0"/>
+          <a:chExt cx="0" cy="0"/>
+        </a:xfrm>
+      </p:grpSpPr>
+      <p:sp>
+        <p:nvSpPr>
+          <p:cNvPr id="133" name="Google Shape;133;p26"/>
+          <p:cNvSpPr txBox="1"/>
+          <p:nvPr>
+            <p:ph type="title"/>
+          </p:nvPr>
+        </p:nvSpPr>
+        <p:spPr>
+          <a:xfrm>
+            <a:off x="311700" y="445025"/>
+            <a:ext cx="8520600" cy="572700"/>
+          </a:xfrm>
+          <a:prstGeom prst="rect">
+            <a:avLst/>
+          </a:prstGeom>
+        </p:spPr>
+        <p:txBody>
+          <a:bodyPr anchorCtr="0" anchor="t" bIns="91425" lIns="91425" spcFirstLastPara="1" rIns="91425" wrap="square" tIns="91425">
+            <a:normAutofit fontScale="90000"/>
+          </a:bodyPr>
+          <a:lstStyle/>
+          <a:p>
+            <a:pPr indent="0" lvl="0" marL="0" rtl="0" algn="l">
+              <a:spcBef>
+                <a:spcPts val="0"/>
+              </a:spcBef>
+              <a:spcAft>
+                <a:spcPts val="0"/>
+              </a:spcAft>
+              <a:buNone/>
+            </a:pPr>
+            <a:r>
+              <a:rPr lang="en-GB"/>
+              <a:t>Fetch Nearest - Result</a:t>
+            </a:r>
+            <a:endParaRPr/>
+          </a:p>
+        </p:txBody>
+      </p:sp>
+      <p:sp>
+        <p:nvSpPr>
+          <p:cNvPr id="134" name="Google Shape;134;p26"/>
+          <p:cNvSpPr txBox="1"/>
+          <p:nvPr>
+            <p:ph idx="1" type="body"/>
+          </p:nvPr>
+        </p:nvSpPr>
+        <p:spPr>
+          <a:xfrm>
+            <a:off x="311700" y="1152475"/>
+            <a:ext cx="8520600" cy="3416400"/>
+          </a:xfrm>
+          <a:prstGeom prst="rect">
+            <a:avLst/>
+          </a:prstGeom>
+        </p:spPr>
+        <p:txBody>
+          <a:bodyPr anchorCtr="0" anchor="t" bIns="91425" lIns="91425" spcFirstLastPara="1" rIns="91425" wrap="square" tIns="91425">
+            <a:normAutofit/>
+          </a:bodyPr>
+          <a:lstStyle/>
+          <a:p>
+            <a:pPr indent="0" lvl="0" marL="0" rtl="0" algn="l">
+              <a:spcBef>
+                <a:spcPts val="0"/>
+              </a:spcBef>
+              <a:spcAft>
+                <a:spcPts val="0"/>
+              </a:spcAft>
+              <a:buNone/>
+            </a:pPr>
+            <a:r>
+              <a:rPr lang="en-GB"/>
+              <a:t>{</a:t>
+            </a:r>
+            <a:endParaRPr/>
+          </a:p>
+          <a:p>
+            <a:pPr indent="0" lvl="0" marL="0" rtl="0" algn="l">
+              <a:spcBef>
+                <a:spcPts val="1200"/>
+              </a:spcBef>
+              <a:spcAft>
+                <a:spcPts val="0"/>
+              </a:spcAft>
+              <a:buNone/>
+            </a:pPr>
+            <a:r>
+              <a:rPr lang="en-GB"/>
+              <a:t>        "id": 2415498415,</a:t>
+            </a:r>
+            <a:endParaRPr/>
+          </a:p>
+          <a:p>
+            <a:pPr indent="0" lvl="0" marL="0" rtl="0" algn="l">
+              <a:spcBef>
+                <a:spcPts val="1200"/>
+              </a:spcBef>
+              <a:spcAft>
+                <a:spcPts val="0"/>
+              </a:spcAft>
+              <a:buNone/>
+            </a:pPr>
+            <a:r>
+              <a:rPr lang="en-GB"/>
+              <a:t>        "plot": 3,</a:t>
+            </a:r>
+            <a:endParaRPr/>
+          </a:p>
+          <a:p>
+            <a:pPr indent="0" lvl="0" marL="0" rtl="0" algn="l">
+              <a:spcBef>
+                <a:spcPts val="1200"/>
+              </a:spcBef>
+              <a:spcAft>
+                <a:spcPts val="0"/>
+              </a:spcAft>
+              <a:buNone/>
+            </a:pPr>
+            <a:r>
+              <a:rPr lang="en-GB"/>
+              <a:t>        "timeTaken": 7</a:t>
+            </a:r>
+            <a:endParaRPr/>
+          </a:p>
+          <a:p>
+            <a:pPr indent="0" lvl="0" marL="0" rtl="0" algn="l">
+              <a:spcBef>
+                <a:spcPts val="1200"/>
+              </a:spcBef>
+              <a:spcAft>
+                <a:spcPts val="0"/>
+              </a:spcAft>
+              <a:buNone/>
+            </a:pPr>
+            <a:r>
+              <a:rPr lang="en-GB"/>
+              <a:t>}</a:t>
+            </a:r>
+            <a:endParaRPr/>
+          </a:p>
+          <a:p>
+            <a:pPr indent="0" lvl="0" marL="0" rtl="0" algn="l">
+              <a:spcBef>
+                <a:spcPts val="1200"/>
+              </a:spcBef>
+              <a:spcAft>
+                <a:spcPts val="0"/>
+              </a:spcAft>
+              <a:buNone/>
+            </a:pPr>
+            <a:r>
+              <a:t/>
+            </a:r>
+            <a:endParaRPr/>
+          </a:p>
+          <a:p>
+            <a:pPr indent="0" lvl="0" marL="0" rtl="0" algn="l">
+              <a:spcBef>
+                <a:spcPts val="1200"/>
+              </a:spcBef>
+              <a:spcAft>
+                <a:spcPts val="1200"/>
+              </a:spcAft>
+              <a:buNone/>
+            </a:pPr>
+            <a:r>
+              <a:t/>
+            </a:r>
+            <a:endParaRPr/>
+          </a:p>
+        </p:txBody>
+      </p:sp>
+    </p:spTree>
+  </p:cSld>
+  <p:clrMapOvr>
+    <a:masterClrMapping/>
+  </p:clrMapOvr>
+</p:sld>
+</file>
+
+<file path=ppt/slides/slide15.xml><?xml version="1.0" encoding="utf-8"?>
+<p:sld xmlns:a="http://schemas.openxmlformats.org/drawingml/2006/main" xmlns:r="http://schemas.openxmlformats.org/officeDocument/2006/relationships" xmlns:mc="http://schemas.openxmlformats.org/markup-compatibility/2006" xmlns:mv="urn:schemas-microsoft-com:mac:vml" xmlns:p="http://schemas.openxmlformats.org/presentationml/2006/main" xmlns:c="http://schemas.openxmlformats.org/drawingml/2006/chart" xmlns:dgm="http://schemas.openxmlformats.org/drawingml/2006/diagram" xmlns:o="urn:schemas-microsoft-com:office:office" xmlns:v="urn:schemas-microsoft-com:vml" xmlns:pvml="urn:schemas-microsoft-com:office:powerpoint" xmlns:com="http://schemas.openxmlformats.org/drawingml/2006/compatibility" xmlns:p14="http://schemas.microsoft.com/office/powerpoint/2010/main" xmlns:p15="http://schemas.microsoft.com/office/powerpoint/2012/main" xmlns:ahyp="http://schemas.microsoft.com/office/drawing/2018/hyperlinkcolor">
+  <p:cSld>
+    <p:spTree>
+      <p:nvGrpSpPr>
+        <p:cNvPr id="138" name="Shape 138"/>
+        <p:cNvGrpSpPr/>
+        <p:nvPr/>
+      </p:nvGrpSpPr>
+      <p:grpSpPr>
+        <a:xfrm>
+          <a:off x="0" y="0"/>
+          <a:ext cx="0" cy="0"/>
+          <a:chOff x="0" y="0"/>
+          <a:chExt cx="0" cy="0"/>
+        </a:xfrm>
+      </p:grpSpPr>
+      <p:sp>
+        <p:nvSpPr>
+          <p:cNvPr id="139" name="Google Shape;139;p27"/>
+          <p:cNvSpPr txBox="1"/>
+          <p:nvPr>
+            <p:ph type="title"/>
+          </p:nvPr>
+        </p:nvSpPr>
+        <p:spPr>
+          <a:xfrm>
+            <a:off x="311700" y="445025"/>
+            <a:ext cx="8520600" cy="572700"/>
+          </a:xfrm>
+          <a:prstGeom prst="rect">
+            <a:avLst/>
+          </a:prstGeom>
+        </p:spPr>
+        <p:txBody>
+          <a:bodyPr anchorCtr="0" anchor="t" bIns="91425" lIns="91425" spcFirstLastPara="1" rIns="91425" wrap="square" tIns="91425">
+            <a:normAutofit fontScale="90000"/>
+          </a:bodyPr>
+          <a:lstStyle/>
+          <a:p>
+            <a:pPr indent="0" lvl="0" marL="0" rtl="0" algn="l">
+              <a:spcBef>
+                <a:spcPts val="0"/>
+              </a:spcBef>
+              <a:spcAft>
+                <a:spcPts val="0"/>
+              </a:spcAft>
+              <a:buNone/>
+            </a:pPr>
+            <a:r>
+              <a:rPr lang="en-GB"/>
+              <a:t>Scan - Request</a:t>
+            </a:r>
+            <a:endParaRPr/>
+          </a:p>
+        </p:txBody>
+      </p:sp>
+      <p:sp>
+        <p:nvSpPr>
+          <p:cNvPr id="140" name="Google Shape;140;p27"/>
+          <p:cNvSpPr txBox="1"/>
+          <p:nvPr>
+            <p:ph idx="1" type="body"/>
+          </p:nvPr>
+        </p:nvSpPr>
+        <p:spPr>
+          <a:xfrm>
+            <a:off x="311700" y="1152475"/>
+            <a:ext cx="8520600" cy="3416400"/>
+          </a:xfrm>
+          <a:prstGeom prst="rect">
+            <a:avLst/>
+          </a:prstGeom>
+        </p:spPr>
+        <p:txBody>
+          <a:bodyPr anchorCtr="0" anchor="t" bIns="91425" lIns="91425" spcFirstLastPara="1" rIns="91425" wrap="square" tIns="91425">
+            <a:normAutofit fontScale="70000" lnSpcReduction="20000"/>
+          </a:bodyPr>
+          <a:lstStyle/>
+          <a:p>
+            <a:pPr indent="0" lvl="0" marL="0" rtl="0" algn="l">
+              <a:spcBef>
+                <a:spcPts val="0"/>
+              </a:spcBef>
+              <a:spcAft>
+                <a:spcPts val="0"/>
+              </a:spcAft>
+              <a:buNone/>
+            </a:pPr>
+            <a:r>
+              <a:rPr lang="en-GB"/>
+              <a:t>{</a:t>
+            </a:r>
+            <a:endParaRPr/>
+          </a:p>
+          <a:p>
+            <a:pPr indent="0" lvl="0" marL="0" rtl="0" algn="l">
+              <a:spcBef>
+                <a:spcPts val="1200"/>
+              </a:spcBef>
+              <a:spcAft>
+                <a:spcPts val="0"/>
+              </a:spcAft>
+              <a:buNone/>
+            </a:pPr>
+            <a:r>
+              <a:rPr lang="en-GB"/>
+              <a:t>        "method": "scan",</a:t>
+            </a:r>
+            <a:endParaRPr/>
+          </a:p>
+          <a:p>
+            <a:pPr indent="0" lvl="0" marL="0" rtl="0" algn="l">
+              <a:spcBef>
+                <a:spcPts val="1200"/>
+              </a:spcBef>
+              <a:spcAft>
+                <a:spcPts val="0"/>
+              </a:spcAft>
+              <a:buNone/>
+            </a:pPr>
+            <a:r>
+              <a:rPr lang="en-GB"/>
+              <a:t>        "params": {</a:t>
+            </a:r>
+            <a:endParaRPr/>
+          </a:p>
+          <a:p>
+            <a:pPr indent="0" lvl="0" marL="0" rtl="0" algn="l">
+              <a:spcBef>
+                <a:spcPts val="1200"/>
+              </a:spcBef>
+              <a:spcAft>
+                <a:spcPts val="0"/>
+              </a:spcAft>
+              <a:buNone/>
+            </a:pPr>
+            <a:r>
+              <a:rPr lang="en-GB"/>
+              <a:t>            "plot": 7,</a:t>
+            </a:r>
+            <a:endParaRPr/>
+          </a:p>
+          <a:p>
+            <a:pPr indent="0" lvl="0" marL="0" rtl="0" algn="l">
+              <a:spcBef>
+                <a:spcPts val="1200"/>
+              </a:spcBef>
+              <a:spcAft>
+                <a:spcPts val="0"/>
+              </a:spcAft>
+              <a:buNone/>
+            </a:pPr>
+            <a:r>
+              <a:rPr lang="en-GB"/>
+              <a:t>            "id": 65318,</a:t>
+            </a:r>
+            <a:endParaRPr/>
+          </a:p>
+          <a:p>
+            <a:pPr indent="0" lvl="0" marL="0" rtl="0" algn="l">
+              <a:spcBef>
+                <a:spcPts val="1200"/>
+              </a:spcBef>
+              <a:spcAft>
+                <a:spcPts val="0"/>
+              </a:spcAft>
+              <a:buNone/>
+            </a:pPr>
+            <a:r>
+              <a:rPr lang="en-GB"/>
+              <a:t>            "serverTime": 1616352045,</a:t>
+            </a:r>
+            <a:endParaRPr/>
+          </a:p>
+          <a:p>
+            <a:pPr indent="0" lvl="0" marL="0" rtl="0" algn="l">
+              <a:spcBef>
+                <a:spcPts val="1200"/>
+              </a:spcBef>
+              <a:spcAft>
+                <a:spcPts val="0"/>
+              </a:spcAft>
+              <a:buNone/>
+            </a:pPr>
+            <a:r>
+              <a:rPr lang="en-GB"/>
+              <a:t>            "completeIn": 40</a:t>
+            </a:r>
+            <a:endParaRPr/>
+          </a:p>
+          <a:p>
+            <a:pPr indent="0" lvl="0" marL="0" rtl="0" algn="l">
+              <a:spcBef>
+                <a:spcPts val="1200"/>
+              </a:spcBef>
+              <a:spcAft>
+                <a:spcPts val="0"/>
+              </a:spcAft>
+              <a:buNone/>
+            </a:pPr>
+            <a:r>
+              <a:rPr lang="en-GB"/>
+              <a:t>        }</a:t>
+            </a:r>
+            <a:endParaRPr/>
+          </a:p>
+          <a:p>
+            <a:pPr indent="0" lvl="0" marL="0" rtl="0" algn="l">
+              <a:spcBef>
+                <a:spcPts val="1200"/>
+              </a:spcBef>
+              <a:spcAft>
+                <a:spcPts val="0"/>
+              </a:spcAft>
+              <a:buNone/>
+            </a:pPr>
+            <a:r>
+              <a:rPr lang="en-GB"/>
+              <a:t>    }</a:t>
+            </a:r>
+            <a:endParaRPr/>
+          </a:p>
+          <a:p>
+            <a:pPr indent="0" lvl="0" marL="0" rtl="0" algn="l">
+              <a:spcBef>
+                <a:spcPts val="1200"/>
+              </a:spcBef>
+              <a:spcAft>
+                <a:spcPts val="1200"/>
+              </a:spcAft>
+              <a:buNone/>
+            </a:pPr>
+            <a:r>
+              <a:t/>
+            </a:r>
+            <a:endParaRPr/>
+          </a:p>
+        </p:txBody>
+      </p:sp>
+    </p:spTree>
+  </p:cSld>
+  <p:clrMapOvr>
+    <a:masterClrMapping/>
+  </p:clrMapOvr>
+</p:sld>
+</file>
+
+<file path=ppt/slides/slide16.xml><?xml version="1.0" encoding="utf-8"?>
+<p:sld xmlns:a="http://schemas.openxmlformats.org/drawingml/2006/main" xmlns:r="http://schemas.openxmlformats.org/officeDocument/2006/relationships" xmlns:mc="http://schemas.openxmlformats.org/markup-compatibility/2006" xmlns:mv="urn:schemas-microsoft-com:mac:vml" xmlns:p="http://schemas.openxmlformats.org/presentationml/2006/main" xmlns:c="http://schemas.openxmlformats.org/drawingml/2006/chart" xmlns:dgm="http://schemas.openxmlformats.org/drawingml/2006/diagram" xmlns:o="urn:schemas-microsoft-com:office:office" xmlns:v="urn:schemas-microsoft-com:vml" xmlns:pvml="urn:schemas-microsoft-com:office:powerpoint" xmlns:com="http://schemas.openxmlformats.org/drawingml/2006/compatibility" xmlns:p14="http://schemas.microsoft.com/office/powerpoint/2010/main" xmlns:p15="http://schemas.microsoft.com/office/powerpoint/2012/main" xmlns:ahyp="http://schemas.microsoft.com/office/drawing/2018/hyperlinkcolor">
+  <p:cSld>
+    <p:spTree>
+      <p:nvGrpSpPr>
+        <p:cNvPr id="144" name="Shape 144"/>
+        <p:cNvGrpSpPr/>
+        <p:nvPr/>
+      </p:nvGrpSpPr>
+      <p:grpSpPr>
+        <a:xfrm>
+          <a:off x="0" y="0"/>
+          <a:ext cx="0" cy="0"/>
+          <a:chOff x="0" y="0"/>
+          <a:chExt cx="0" cy="0"/>
+        </a:xfrm>
+      </p:grpSpPr>
+      <p:sp>
+        <p:nvSpPr>
+          <p:cNvPr id="145" name="Google Shape;145;p28"/>
+          <p:cNvSpPr txBox="1"/>
+          <p:nvPr>
+            <p:ph type="title"/>
+          </p:nvPr>
+        </p:nvSpPr>
+        <p:spPr>
+          <a:xfrm>
+            <a:off x="311700" y="445025"/>
+            <a:ext cx="8520600" cy="572700"/>
+          </a:xfrm>
+          <a:prstGeom prst="rect">
+            <a:avLst/>
+          </a:prstGeom>
+        </p:spPr>
+        <p:txBody>
+          <a:bodyPr anchorCtr="0" anchor="t" bIns="91425" lIns="91425" spcFirstLastPara="1" rIns="91425" wrap="square" tIns="91425">
+            <a:normAutofit fontScale="90000"/>
+          </a:bodyPr>
+          <a:lstStyle/>
+          <a:p>
+            <a:pPr indent="0" lvl="0" marL="0" rtl="0" algn="l">
+              <a:spcBef>
+                <a:spcPts val="0"/>
+              </a:spcBef>
+              <a:spcAft>
+                <a:spcPts val="0"/>
+              </a:spcAft>
+              <a:buNone/>
+            </a:pPr>
+            <a:r>
+              <a:rPr lang="en-GB"/>
+              <a:t>Scan - Result</a:t>
+            </a:r>
+            <a:endParaRPr/>
+          </a:p>
+        </p:txBody>
+      </p:sp>
+      <p:sp>
+        <p:nvSpPr>
+          <p:cNvPr id="146" name="Google Shape;146;p28"/>
+          <p:cNvSpPr txBox="1"/>
+          <p:nvPr>
+            <p:ph idx="1" type="body"/>
+          </p:nvPr>
+        </p:nvSpPr>
+        <p:spPr>
+          <a:xfrm>
+            <a:off x="311700" y="1152475"/>
+            <a:ext cx="8520600" cy="3416400"/>
+          </a:xfrm>
+          <a:prstGeom prst="rect">
+            <a:avLst/>
+          </a:prstGeom>
+        </p:spPr>
+        <p:txBody>
+          <a:bodyPr anchorCtr="0" anchor="t" bIns="91425" lIns="91425" spcFirstLastPara="1" rIns="91425" wrap="square" tIns="91425">
+            <a:normAutofit/>
+          </a:bodyPr>
+          <a:lstStyle/>
+          <a:p>
+            <a:pPr indent="0" lvl="0" marL="0" rtl="0" algn="l">
+              <a:spcBef>
+                <a:spcPts val="0"/>
+              </a:spcBef>
+              <a:spcAft>
+                <a:spcPts val="0"/>
+              </a:spcAft>
+              <a:buNone/>
+            </a:pPr>
+            <a:r>
+              <a:rPr lang="en-GB"/>
+              <a:t>{</a:t>
+            </a:r>
+            <a:endParaRPr/>
+          </a:p>
+          <a:p>
+            <a:pPr indent="0" lvl="0" marL="0" rtl="0" algn="l">
+              <a:spcBef>
+                <a:spcPts val="1200"/>
+              </a:spcBef>
+              <a:spcAft>
+                <a:spcPts val="0"/>
+              </a:spcAft>
+              <a:buNone/>
+            </a:pPr>
+            <a:r>
+              <a:rPr lang="en-GB"/>
+              <a:t>        "id": 65318,</a:t>
+            </a:r>
+            <a:endParaRPr/>
+          </a:p>
+          <a:p>
+            <a:pPr indent="0" lvl="0" marL="0" rtl="0" algn="l">
+              <a:spcBef>
+                <a:spcPts val="1200"/>
+              </a:spcBef>
+              <a:spcAft>
+                <a:spcPts val="0"/>
+              </a:spcAft>
+              <a:buNone/>
+            </a:pPr>
+            <a:r>
+              <a:rPr lang="en-GB"/>
+              <a:t>        "type": "minorInjury",</a:t>
+            </a:r>
+            <a:endParaRPr/>
+          </a:p>
+          <a:p>
+            <a:pPr indent="0" lvl="0" marL="0" rtl="0" algn="l">
+              <a:spcBef>
+                <a:spcPts val="1200"/>
+              </a:spcBef>
+              <a:spcAft>
+                <a:spcPts val="0"/>
+              </a:spcAft>
+              <a:buNone/>
+            </a:pPr>
+            <a:r>
+              <a:rPr lang="en-GB"/>
+              <a:t>        "timeTaken": 35</a:t>
+            </a:r>
+            <a:endParaRPr/>
+          </a:p>
+          <a:p>
+            <a:pPr indent="0" lvl="0" marL="0" rtl="0" algn="l">
+              <a:spcBef>
+                <a:spcPts val="1200"/>
+              </a:spcBef>
+              <a:spcAft>
+                <a:spcPts val="0"/>
+              </a:spcAft>
+              <a:buNone/>
+            </a:pPr>
+            <a:r>
+              <a:rPr lang="en-GB"/>
+              <a:t> }</a:t>
+            </a:r>
+            <a:endParaRPr/>
+          </a:p>
+          <a:p>
+            <a:pPr indent="0" lvl="0" marL="0" rtl="0" algn="l">
+              <a:spcBef>
+                <a:spcPts val="1200"/>
+              </a:spcBef>
+              <a:spcAft>
+                <a:spcPts val="1200"/>
+              </a:spcAft>
+              <a:buNone/>
+            </a:pPr>
+            <a:r>
+              <a:t/>
+            </a:r>
+            <a:endParaRPr/>
+          </a:p>
+        </p:txBody>
+      </p:sp>
+    </p:spTree>
+  </p:cSld>
+  <p:clrMapOvr>
+    <a:masterClrMapping/>
+  </p:clrMapOvr>
+</p:sld>
+</file>
+
+<file path=ppt/slides/slide17.xml><?xml version="1.0" encoding="utf-8"?>
+<p:sld xmlns:a="http://schemas.openxmlformats.org/drawingml/2006/main" xmlns:r="http://schemas.openxmlformats.org/officeDocument/2006/relationships" xmlns:mc="http://schemas.openxmlformats.org/markup-compatibility/2006" xmlns:mv="urn:schemas-microsoft-com:mac:vml" xmlns:p="http://schemas.openxmlformats.org/presentationml/2006/main" xmlns:c="http://schemas.openxmlformats.org/drawingml/2006/chart" xmlns:dgm="http://schemas.openxmlformats.org/drawingml/2006/diagram" xmlns:o="urn:schemas-microsoft-com:office:office" xmlns:v="urn:schemas-microsoft-com:vml" xmlns:pvml="urn:schemas-microsoft-com:office:powerpoint" xmlns:com="http://schemas.openxmlformats.org/drawingml/2006/compatibility" xmlns:p14="http://schemas.microsoft.com/office/powerpoint/2010/main" xmlns:p15="http://schemas.microsoft.com/office/powerpoint/2012/main" xmlns:ahyp="http://schemas.microsoft.com/office/drawing/2018/hyperlinkcolor">
+  <p:cSld>
+    <p:spTree>
+      <p:nvGrpSpPr>
+        <p:cNvPr id="150" name="Shape 150"/>
+        <p:cNvGrpSpPr/>
+        <p:nvPr/>
+      </p:nvGrpSpPr>
+      <p:grpSpPr>
+        <a:xfrm>
+          <a:off x="0" y="0"/>
+          <a:ext cx="0" cy="0"/>
+          <a:chOff x="0" y="0"/>
+          <a:chExt cx="0" cy="0"/>
+        </a:xfrm>
+      </p:grpSpPr>
+      <p:sp>
+        <p:nvSpPr>
+          <p:cNvPr id="151" name="Google Shape;151;p29"/>
+          <p:cNvSpPr txBox="1"/>
+          <p:nvPr>
+            <p:ph type="title"/>
+          </p:nvPr>
+        </p:nvSpPr>
+        <p:spPr>
+          <a:xfrm>
+            <a:off x="311700" y="445025"/>
+            <a:ext cx="8520600" cy="572700"/>
+          </a:xfrm>
+          <a:prstGeom prst="rect">
+            <a:avLst/>
+          </a:prstGeom>
+        </p:spPr>
+        <p:txBody>
+          <a:bodyPr anchorCtr="0" anchor="t" bIns="91425" lIns="91425" spcFirstLastPara="1" rIns="91425" wrap="square" tIns="91425">
+            <a:normAutofit fontScale="90000"/>
+          </a:bodyPr>
+          <a:lstStyle/>
+          <a:p>
+            <a:pPr indent="0" lvl="0" marL="0" rtl="0" algn="l">
+              <a:spcBef>
+                <a:spcPts val="0"/>
+              </a:spcBef>
+              <a:spcAft>
+                <a:spcPts val="0"/>
+              </a:spcAft>
+              <a:buNone/>
+            </a:pPr>
+            <a:r>
+              <a:rPr lang="en-GB"/>
+              <a:t>Presentation of Theme Run</a:t>
+            </a:r>
+            <a:endParaRPr/>
+          </a:p>
+        </p:txBody>
+      </p:sp>
+      <p:sp>
+        <p:nvSpPr>
+          <p:cNvPr id="152" name="Google Shape;152;p29"/>
+          <p:cNvSpPr txBox="1"/>
+          <p:nvPr>
+            <p:ph idx="1" type="body"/>
+          </p:nvPr>
+        </p:nvSpPr>
+        <p:spPr>
+          <a:xfrm>
+            <a:off x="311700" y="1152475"/>
+            <a:ext cx="8520600" cy="3416400"/>
+          </a:xfrm>
+          <a:prstGeom prst="rect">
+            <a:avLst/>
+          </a:prstGeom>
+        </p:spPr>
+        <p:txBody>
+          <a:bodyPr anchorCtr="0" anchor="t" bIns="91425" lIns="91425" spcFirstLastPara="1" rIns="91425" wrap="square" tIns="91425">
+            <a:normAutofit/>
+          </a:bodyPr>
+          <a:lstStyle/>
+          <a:p>
+            <a:pPr indent="-342900" lvl="0" marL="457200" rtl="0" algn="l">
+              <a:spcBef>
+                <a:spcPts val="0"/>
+              </a:spcBef>
+              <a:spcAft>
+                <a:spcPts val="0"/>
+              </a:spcAft>
+              <a:buSzPts val="1800"/>
+              <a:buAutoNum type="arabicPeriod"/>
+            </a:pPr>
+            <a:r>
+              <a:rPr lang="en-GB"/>
+              <a:t>Develop a nice and self-explanatory UI for the theme run.</a:t>
+            </a:r>
+            <a:endParaRPr/>
+          </a:p>
+          <a:p>
+            <a:pPr indent="-342900" lvl="0" marL="457200" rtl="0" algn="l">
+              <a:spcBef>
+                <a:spcPts val="0"/>
+              </a:spcBef>
+              <a:spcAft>
+                <a:spcPts val="0"/>
+              </a:spcAft>
+              <a:buSzPts val="1800"/>
+              <a:buAutoNum type="arabicPeriod"/>
+            </a:pPr>
+            <a:r>
+              <a:rPr lang="en-GB"/>
+              <a:t>It can be a web app, a desktop app, or a mobile app (or cross platform).</a:t>
+            </a:r>
+            <a:endParaRPr/>
+          </a:p>
+          <a:p>
+            <a:pPr indent="-342900" lvl="0" marL="457200" rtl="0" algn="l">
+              <a:spcBef>
+                <a:spcPts val="0"/>
+              </a:spcBef>
+              <a:spcAft>
+                <a:spcPts val="0"/>
+              </a:spcAft>
+              <a:buSzPts val="1800"/>
+              <a:buAutoNum type="arabicPeriod"/>
+            </a:pPr>
+            <a:r>
+              <a:rPr lang="en-GB"/>
+              <a:t>It should show what is happening on the arena and what the robot is doing, for example, the plot it is visiting next, the type of injury scanned, the request it is performing, etc.</a:t>
+            </a:r>
+            <a:endParaRPr/>
+          </a:p>
+          <a:p>
+            <a:pPr indent="-342900" lvl="0" marL="457200" rtl="0" algn="l">
+              <a:spcBef>
+                <a:spcPts val="0"/>
+              </a:spcBef>
+              <a:spcAft>
+                <a:spcPts val="0"/>
+              </a:spcAft>
+              <a:buSzPts val="1800"/>
+              <a:buAutoNum type="arabicPeriod"/>
+            </a:pPr>
+            <a:r>
+              <a:rPr lang="en-GB"/>
+              <a:t>Use your good judgement to determine how much information to display.</a:t>
+            </a:r>
+            <a:endParaRPr/>
+          </a:p>
+        </p:txBody>
+      </p:sp>
+    </p:spTree>
+  </p:cSld>
+  <p:clrMapOvr>
+    <a:masterClrMapping/>
+  </p:clrMapOvr>
+</p:sld>
+</file>
+
+<file path=ppt/slides/slide18.xml><?xml version="1.0" encoding="utf-8"?>
+<p:sld xmlns:a="http://schemas.openxmlformats.org/drawingml/2006/main" xmlns:r="http://schemas.openxmlformats.org/officeDocument/2006/relationships" xmlns:mc="http://schemas.openxmlformats.org/markup-compatibility/2006" xmlns:mv="urn:schemas-microsoft-com:mac:vml" xmlns:p="http://schemas.openxmlformats.org/presentationml/2006/main" xmlns:c="http://schemas.openxmlformats.org/drawingml/2006/chart" xmlns:dgm="http://schemas.openxmlformats.org/drawingml/2006/diagram" xmlns:o="urn:schemas-microsoft-com:office:office" xmlns:v="urn:schemas-microsoft-com:vml" xmlns:pvml="urn:schemas-microsoft-com:office:powerpoint" xmlns:com="http://schemas.openxmlformats.org/drawingml/2006/compatibility" xmlns:p14="http://schemas.microsoft.com/office/powerpoint/2010/main" xmlns:p15="http://schemas.microsoft.com/office/powerpoint/2012/main" xmlns:ahyp="http://schemas.microsoft.com/office/drawing/2018/hyperlinkcolor">
+  <p:cSld>
+    <p:spTree>
+      <p:nvGrpSpPr>
+        <p:cNvPr id="156" name="Shape 156"/>
+        <p:cNvGrpSpPr/>
+        <p:nvPr/>
+      </p:nvGrpSpPr>
+      <p:grpSpPr>
+        <a:xfrm>
+          <a:off x="0" y="0"/>
+          <a:ext cx="0" cy="0"/>
+          <a:chOff x="0" y="0"/>
+          <a:chExt cx="0" cy="0"/>
+        </a:xfrm>
+      </p:grpSpPr>
+      <p:sp>
+        <p:nvSpPr>
+          <p:cNvPr id="157" name="Google Shape;157;p30"/>
+          <p:cNvSpPr txBox="1"/>
+          <p:nvPr>
+            <p:ph type="title"/>
+          </p:nvPr>
+        </p:nvSpPr>
+        <p:spPr>
+          <a:xfrm>
+            <a:off x="311700" y="2116775"/>
+            <a:ext cx="8520600" cy="1027200"/>
+          </a:xfrm>
+          <a:prstGeom prst="rect">
+            <a:avLst/>
+          </a:prstGeom>
+        </p:spPr>
+        <p:txBody>
+          <a:bodyPr anchorCtr="0" anchor="t" bIns="91425" lIns="91425" spcFirstLastPara="1" rIns="91425" wrap="square" tIns="91425">
+            <a:noAutofit/>
+          </a:bodyPr>
+          <a:lstStyle/>
+          <a:p>
+            <a:pPr indent="0" lvl="0" marL="0" rtl="0" algn="ctr">
+              <a:spcBef>
+                <a:spcPts val="0"/>
+              </a:spcBef>
+              <a:spcAft>
+                <a:spcPts val="0"/>
+              </a:spcAft>
+              <a:buSzPts val="990"/>
+              <a:buNone/>
+            </a:pPr>
+            <a:r>
+              <a:rPr lang="en-GB" sz="4820"/>
+              <a:t>Thank you!</a:t>
+            </a:r>
+            <a:endParaRPr sz="4820"/>
+          </a:p>
+        </p:txBody>
+      </p:sp>
+    </p:spTree>
+  </p:cSld>
+  <p:clrMapOvr>
+    <a:masterClrMapping/>
+  </p:clrMapOvr>
+</p:sld>
+</file>
+
 <file path=ppt/slides/slide2.xml><?xml version="1.0" encoding="utf-8"?>
 <p:sld xmlns:a="http://schemas.openxmlformats.org/drawingml/2006/main" xmlns:r="http://schemas.openxmlformats.org/officeDocument/2006/relationships" xmlns:mc="http://schemas.openxmlformats.org/markup-compatibility/2006" xmlns:mv="urn:schemas-microsoft-com:mac:vml" xmlns:p="http://schemas.openxmlformats.org/presentationml/2006/main" xmlns:c="http://schemas.openxmlformats.org/drawingml/2006/chart" xmlns:dgm="http://schemas.openxmlformats.org/drawingml/2006/diagram" xmlns:o="urn:schemas-microsoft-com:office:office" xmlns:v="urn:schemas-microsoft-com:vml" xmlns:pvml="urn:schemas-microsoft-com:office:powerpoint" xmlns:com="http://schemas.openxmlformats.org/drawingml/2006/compatibility" xmlns:p14="http://schemas.microsoft.com/office/powerpoint/2010/main" xmlns:p15="http://schemas.microsoft.com/office/powerpoint/2012/main" xmlns:ahyp="http://schemas.microsoft.com/office/drawing/2018/hyperlinkcolor">
   <p:cSld>
@@ -6250,7 +9348,7 @@
             <a:tbl>
               <a:tblPr>
                 <a:noFill/>
-                <a:tableStyleId>{68AA5716-714A-455E-9D57-4246DC9C7805}</a:tableStyleId>
+                <a:tableStyleId>{23682C59-5C13-449A-B546-3DAF82176B9F}</a:tableStyleId>
               </a:tblPr>
               <a:tblGrid>
                 <a:gridCol w="1033025"/>
@@ -8029,6 +11127,403 @@
 </p:sld>
 </file>
 
+<file path=ppt/slides/slide7.xml><?xml version="1.0" encoding="utf-8"?>
+<p:sld xmlns:a="http://schemas.openxmlformats.org/drawingml/2006/main" xmlns:r="http://schemas.openxmlformats.org/officeDocument/2006/relationships" xmlns:mc="http://schemas.openxmlformats.org/markup-compatibility/2006" xmlns:mv="urn:schemas-microsoft-com:mac:vml" xmlns:p="http://schemas.openxmlformats.org/presentationml/2006/main" xmlns:c="http://schemas.openxmlformats.org/drawingml/2006/chart" xmlns:dgm="http://schemas.openxmlformats.org/drawingml/2006/diagram" xmlns:o="urn:schemas-microsoft-com:office:office" xmlns:v="urn:schemas-microsoft-com:vml" xmlns:pvml="urn:schemas-microsoft-com:office:powerpoint" xmlns:com="http://schemas.openxmlformats.org/drawingml/2006/compatibility" xmlns:p14="http://schemas.microsoft.com/office/powerpoint/2010/main" xmlns:p15="http://schemas.microsoft.com/office/powerpoint/2012/main" xmlns:ahyp="http://schemas.microsoft.com/office/drawing/2018/hyperlinkcolor">
+  <p:cSld>
+    <p:spTree>
+      <p:nvGrpSpPr>
+        <p:cNvPr id="90" name="Shape 90"/>
+        <p:cNvGrpSpPr/>
+        <p:nvPr/>
+      </p:nvGrpSpPr>
+      <p:grpSpPr>
+        <a:xfrm>
+          <a:off x="0" y="0"/>
+          <a:ext cx="0" cy="0"/>
+          <a:chOff x="0" y="0"/>
+          <a:chExt cx="0" cy="0"/>
+        </a:xfrm>
+      </p:grpSpPr>
+      <p:sp>
+        <p:nvSpPr>
+          <p:cNvPr id="91" name="Google Shape;91;p19"/>
+          <p:cNvSpPr txBox="1"/>
+          <p:nvPr>
+            <p:ph type="ctrTitle"/>
+          </p:nvPr>
+        </p:nvSpPr>
+        <p:spPr>
+          <a:xfrm>
+            <a:off x="311708" y="624125"/>
+            <a:ext cx="8520600" cy="2052600"/>
+          </a:xfrm>
+          <a:prstGeom prst="rect">
+            <a:avLst/>
+          </a:prstGeom>
+        </p:spPr>
+        <p:txBody>
+          <a:bodyPr anchorCtr="0" anchor="b" bIns="91425" lIns="91425" spcFirstLastPara="1" rIns="91425" wrap="square" tIns="91425">
+            <a:normAutofit/>
+          </a:bodyPr>
+          <a:lstStyle/>
+          <a:p>
+            <a:pPr indent="0" lvl="0" marL="0" rtl="0" algn="ctr">
+              <a:spcBef>
+                <a:spcPts val="0"/>
+              </a:spcBef>
+              <a:spcAft>
+                <a:spcPts val="0"/>
+              </a:spcAft>
+              <a:buNone/>
+            </a:pPr>
+            <a:r>
+              <a:rPr lang="en-GB"/>
+              <a:t>CS684 Final Project</a:t>
+            </a:r>
+            <a:endParaRPr/>
+          </a:p>
+        </p:txBody>
+      </p:sp>
+      <p:sp>
+        <p:nvSpPr>
+          <p:cNvPr id="92" name="Google Shape;92;p19"/>
+          <p:cNvSpPr txBox="1"/>
+          <p:nvPr>
+            <p:ph idx="1" type="subTitle"/>
+          </p:nvPr>
+        </p:nvSpPr>
+        <p:spPr>
+          <a:xfrm>
+            <a:off x="311700" y="2676725"/>
+            <a:ext cx="8520600" cy="792600"/>
+          </a:xfrm>
+          <a:prstGeom prst="rect">
+            <a:avLst/>
+          </a:prstGeom>
+        </p:spPr>
+        <p:txBody>
+          <a:bodyPr anchorCtr="0" anchor="t" bIns="91425" lIns="91425" spcFirstLastPara="1" rIns="91425" wrap="square" tIns="91425">
+            <a:noAutofit/>
+          </a:bodyPr>
+          <a:lstStyle/>
+          <a:p>
+            <a:pPr indent="0" lvl="0" marL="0" rtl="0" algn="ctr">
+              <a:spcBef>
+                <a:spcPts val="0"/>
+              </a:spcBef>
+              <a:spcAft>
+                <a:spcPts val="0"/>
+              </a:spcAft>
+              <a:buNone/>
+            </a:pPr>
+            <a:r>
+              <a:rPr b="1" lang="en-GB" sz="4000">
+                <a:solidFill>
+                  <a:srgbClr val="D9D9D9"/>
+                </a:solidFill>
+              </a:rPr>
+              <a:t>IoT Part</a:t>
+            </a:r>
+            <a:endParaRPr b="1" sz="4000">
+              <a:solidFill>
+                <a:srgbClr val="D9D9D9"/>
+              </a:solidFill>
+            </a:endParaRPr>
+          </a:p>
+        </p:txBody>
+      </p:sp>
+    </p:spTree>
+  </p:cSld>
+  <p:clrMapOvr>
+    <a:masterClrMapping/>
+  </p:clrMapOvr>
+</p:sld>
+</file>
+
+<file path=ppt/slides/slide8.xml><?xml version="1.0" encoding="utf-8"?>
+<p:sld xmlns:a="http://schemas.openxmlformats.org/drawingml/2006/main" xmlns:r="http://schemas.openxmlformats.org/officeDocument/2006/relationships" xmlns:mc="http://schemas.openxmlformats.org/markup-compatibility/2006" xmlns:mv="urn:schemas-microsoft-com:mac:vml" xmlns:p="http://schemas.openxmlformats.org/presentationml/2006/main" xmlns:c="http://schemas.openxmlformats.org/drawingml/2006/chart" xmlns:dgm="http://schemas.openxmlformats.org/drawingml/2006/diagram" xmlns:o="urn:schemas-microsoft-com:office:office" xmlns:v="urn:schemas-microsoft-com:vml" xmlns:pvml="urn:schemas-microsoft-com:office:powerpoint" xmlns:com="http://schemas.openxmlformats.org/drawingml/2006/compatibility" xmlns:p14="http://schemas.microsoft.com/office/powerpoint/2010/main" xmlns:p15="http://schemas.microsoft.com/office/powerpoint/2012/main" xmlns:ahyp="http://schemas.microsoft.com/office/drawing/2018/hyperlinkcolor">
+  <p:cSld>
+    <p:spTree>
+      <p:nvGrpSpPr>
+        <p:cNvPr id="96" name="Shape 96"/>
+        <p:cNvGrpSpPr/>
+        <p:nvPr/>
+      </p:nvGrpSpPr>
+      <p:grpSpPr>
+        <a:xfrm>
+          <a:off x="0" y="0"/>
+          <a:ext cx="0" cy="0"/>
+          <a:chOff x="0" y="0"/>
+          <a:chExt cx="0" cy="0"/>
+        </a:xfrm>
+      </p:grpSpPr>
+      <p:sp>
+        <p:nvSpPr>
+          <p:cNvPr id="97" name="Google Shape;97;p20"/>
+          <p:cNvSpPr txBox="1"/>
+          <p:nvPr>
+            <p:ph type="title"/>
+          </p:nvPr>
+        </p:nvSpPr>
+        <p:spPr>
+          <a:xfrm>
+            <a:off x="311700" y="445025"/>
+            <a:ext cx="8520600" cy="572700"/>
+          </a:xfrm>
+          <a:prstGeom prst="rect">
+            <a:avLst/>
+          </a:prstGeom>
+        </p:spPr>
+        <p:txBody>
+          <a:bodyPr anchorCtr="0" anchor="t" bIns="91425" lIns="91425" spcFirstLastPara="1" rIns="91425" wrap="square" tIns="91425">
+            <a:normAutofit fontScale="90000"/>
+          </a:bodyPr>
+          <a:lstStyle/>
+          <a:p>
+            <a:pPr indent="0" lvl="0" marL="0" rtl="0" algn="l">
+              <a:spcBef>
+                <a:spcPts val="0"/>
+              </a:spcBef>
+              <a:spcAft>
+                <a:spcPts val="0"/>
+              </a:spcAft>
+              <a:buNone/>
+            </a:pPr>
+            <a:r>
+              <a:rPr lang="en-GB"/>
+              <a:t>Role of IoT</a:t>
+            </a:r>
+            <a:endParaRPr/>
+          </a:p>
+        </p:txBody>
+      </p:sp>
+      <p:sp>
+        <p:nvSpPr>
+          <p:cNvPr id="98" name="Google Shape;98;p20"/>
+          <p:cNvSpPr txBox="1"/>
+          <p:nvPr>
+            <p:ph idx="1" type="body"/>
+          </p:nvPr>
+        </p:nvSpPr>
+        <p:spPr>
+          <a:xfrm>
+            <a:off x="311700" y="1152475"/>
+            <a:ext cx="8520600" cy="3416400"/>
+          </a:xfrm>
+          <a:prstGeom prst="rect">
+            <a:avLst/>
+          </a:prstGeom>
+        </p:spPr>
+        <p:txBody>
+          <a:bodyPr anchorCtr="0" anchor="t" bIns="91425" lIns="91425" spcFirstLastPara="1" rIns="91425" wrap="square" tIns="91425">
+            <a:normAutofit/>
+          </a:bodyPr>
+          <a:lstStyle/>
+          <a:p>
+            <a:pPr indent="-342900" lvl="0" marL="457200" rtl="0" algn="l">
+              <a:spcBef>
+                <a:spcPts val="0"/>
+              </a:spcBef>
+              <a:spcAft>
+                <a:spcPts val="0"/>
+              </a:spcAft>
+              <a:buSzPts val="1800"/>
+              <a:buAutoNum type="arabicPeriod"/>
+            </a:pPr>
+            <a:r>
+              <a:rPr lang="en-GB"/>
+              <a:t>The arena is an abstraction of a disaster-affected area.</a:t>
+            </a:r>
+            <a:endParaRPr/>
+          </a:p>
+          <a:p>
+            <a:pPr indent="-342900" lvl="0" marL="457200" rtl="0" algn="l">
+              <a:spcBef>
+                <a:spcPts val="0"/>
+              </a:spcBef>
+              <a:spcAft>
+                <a:spcPts val="0"/>
+              </a:spcAft>
+              <a:buSzPts val="1800"/>
+              <a:buAutoNum type="arabicPeriod"/>
+            </a:pPr>
+            <a:r>
+              <a:rPr lang="en-GB"/>
+              <a:t>The robot is tasked with scanning the area (or arena), and satisfying the on-demand requests.</a:t>
+            </a:r>
+            <a:endParaRPr/>
+          </a:p>
+          <a:p>
+            <a:pPr indent="-342900" lvl="0" marL="457200" rtl="0" algn="l">
+              <a:spcBef>
+                <a:spcPts val="0"/>
+              </a:spcBef>
+              <a:spcAft>
+                <a:spcPts val="0"/>
+              </a:spcAft>
+              <a:buSzPts val="1800"/>
+              <a:buAutoNum type="arabicPeriod"/>
+            </a:pPr>
+            <a:r>
+              <a:rPr lang="en-GB"/>
+              <a:t>These requests (rpc) are sent from the cloud server at an interval of approximately 45 seconds.</a:t>
+            </a:r>
+            <a:endParaRPr/>
+          </a:p>
+          <a:p>
+            <a:pPr indent="-342900" lvl="0" marL="457200" rtl="0" algn="l">
+              <a:spcBef>
+                <a:spcPts val="0"/>
+              </a:spcBef>
+              <a:spcAft>
+                <a:spcPts val="0"/>
+              </a:spcAft>
+              <a:buSzPts val="1800"/>
+              <a:buAutoNum type="arabicPeriod"/>
+            </a:pPr>
+            <a:r>
+              <a:rPr lang="en-GB"/>
+              <a:t>The requests are intercepted by a laptop and forwarded to the robot. </a:t>
+            </a:r>
+            <a:endParaRPr/>
+          </a:p>
+          <a:p>
+            <a:pPr indent="-342900" lvl="0" marL="457200" rtl="0" algn="l">
+              <a:spcBef>
+                <a:spcPts val="0"/>
+              </a:spcBef>
+              <a:spcAft>
+                <a:spcPts val="0"/>
+              </a:spcAft>
+              <a:buSzPts val="1800"/>
+              <a:buAutoNum type="arabicPeriod"/>
+            </a:pPr>
+            <a:r>
+              <a:rPr lang="en-GB"/>
+              <a:t>The robot can choose to perform the operations as demanded by the requests or ignore them.</a:t>
+            </a:r>
+            <a:endParaRPr/>
+          </a:p>
+          <a:p>
+            <a:pPr indent="-342900" lvl="0" marL="457200" rtl="0" algn="l">
+              <a:spcBef>
+                <a:spcPts val="0"/>
+              </a:spcBef>
+              <a:spcAft>
+                <a:spcPts val="0"/>
+              </a:spcAft>
+              <a:buSzPts val="1800"/>
+              <a:buAutoNum type="arabicPeriod"/>
+            </a:pPr>
+            <a:r>
+              <a:rPr lang="en-GB"/>
+              <a:t>If the robot chose to perform the operations, the result should be returned to the laptop and laptop forwards the result to the server.</a:t>
+            </a:r>
+            <a:endParaRPr/>
+          </a:p>
+        </p:txBody>
+      </p:sp>
+    </p:spTree>
+  </p:cSld>
+  <p:clrMapOvr>
+    <a:masterClrMapping/>
+  </p:clrMapOvr>
+</p:sld>
+</file>
+
+<file path=ppt/slides/slide9.xml><?xml version="1.0" encoding="utf-8"?>
+<p:sld xmlns:a="http://schemas.openxmlformats.org/drawingml/2006/main" xmlns:r="http://schemas.openxmlformats.org/officeDocument/2006/relationships" xmlns:mc="http://schemas.openxmlformats.org/markup-compatibility/2006" xmlns:mv="urn:schemas-microsoft-com:mac:vml" xmlns:p="http://schemas.openxmlformats.org/presentationml/2006/main" xmlns:c="http://schemas.openxmlformats.org/drawingml/2006/chart" xmlns:dgm="http://schemas.openxmlformats.org/drawingml/2006/diagram" xmlns:o="urn:schemas-microsoft-com:office:office" xmlns:v="urn:schemas-microsoft-com:vml" xmlns:pvml="urn:schemas-microsoft-com:office:powerpoint" xmlns:com="http://schemas.openxmlformats.org/drawingml/2006/compatibility" xmlns:p14="http://schemas.microsoft.com/office/powerpoint/2010/main" xmlns:p15="http://schemas.microsoft.com/office/powerpoint/2012/main" xmlns:ahyp="http://schemas.microsoft.com/office/drawing/2018/hyperlinkcolor">
+  <p:cSld>
+    <p:spTree>
+      <p:nvGrpSpPr>
+        <p:cNvPr id="102" name="Shape 102"/>
+        <p:cNvGrpSpPr/>
+        <p:nvPr/>
+      </p:nvGrpSpPr>
+      <p:grpSpPr>
+        <a:xfrm>
+          <a:off x="0" y="0"/>
+          <a:ext cx="0" cy="0"/>
+          <a:chOff x="0" y="0"/>
+          <a:chExt cx="0" cy="0"/>
+        </a:xfrm>
+      </p:grpSpPr>
+      <p:sp>
+        <p:nvSpPr>
+          <p:cNvPr id="103" name="Google Shape;103;p21"/>
+          <p:cNvSpPr txBox="1"/>
+          <p:nvPr>
+            <p:ph type="title"/>
+          </p:nvPr>
+        </p:nvSpPr>
+        <p:spPr>
+          <a:xfrm>
+            <a:off x="2471100" y="4366900"/>
+            <a:ext cx="4201800" cy="572700"/>
+          </a:xfrm>
+          <a:prstGeom prst="rect">
+            <a:avLst/>
+          </a:prstGeom>
+        </p:spPr>
+        <p:txBody>
+          <a:bodyPr anchorCtr="0" anchor="t" bIns="91425" lIns="91425" spcFirstLastPara="1" rIns="91425" wrap="square" tIns="91425">
+            <a:normAutofit fontScale="90000"/>
+          </a:bodyPr>
+          <a:lstStyle/>
+          <a:p>
+            <a:pPr indent="0" lvl="0" marL="0" rtl="0" algn="ctr">
+              <a:spcBef>
+                <a:spcPts val="0"/>
+              </a:spcBef>
+              <a:spcAft>
+                <a:spcPts val="0"/>
+              </a:spcAft>
+              <a:buNone/>
+            </a:pPr>
+            <a:r>
+              <a:rPr lang="en-GB"/>
+              <a:t>Overview of Communication</a:t>
+            </a:r>
+            <a:endParaRPr/>
+          </a:p>
+        </p:txBody>
+      </p:sp>
+      <p:pic>
+        <p:nvPicPr>
+          <p:cNvPr id="104" name="Google Shape;104;p21"/>
+          <p:cNvPicPr preferRelativeResize="0"/>
+          <p:nvPr/>
+        </p:nvPicPr>
+        <p:blipFill>
+          <a:blip r:embed="rId3">
+            <a:alphaModFix/>
+          </a:blip>
+          <a:stretch>
+            <a:fillRect/>
+          </a:stretch>
+        </p:blipFill>
+        <p:spPr>
+          <a:xfrm>
+            <a:off x="1733225" y="365500"/>
+            <a:ext cx="5677551" cy="3945175"/>
+          </a:xfrm>
+          <a:prstGeom prst="rect">
+            <a:avLst/>
+          </a:prstGeom>
+          <a:noFill/>
+          <a:ln>
+            <a:noFill/>
+          </a:ln>
+        </p:spPr>
+      </p:pic>
+    </p:spTree>
+  </p:cSld>
+  <p:clrMapOvr>
+    <a:masterClrMapping/>
+  </p:clrMapOvr>
+</p:sld>
+</file>
+
 <file path=ppt/theme/theme1.xml><?xml version="1.0" encoding="utf-8"?>
 <a:theme xmlns:a="http://schemas.openxmlformats.org/drawingml/2006/main" xmlns:r="http://schemas.openxmlformats.org/officeDocument/2006/relationships" name="Simple Dark">
   <a:themeElements>
@@ -8585,195 +12080,4 @@
     </a:fmtScheme>
   </a:themeElements>
 </a:theme>
-</file>
-
-<file path=customXml/item1.xml><?xml version="1.0" encoding="utf-8"?>
-<ct:contentTypeSchema xmlns:ct="http://schemas.microsoft.com/office/2006/metadata/contentType" xmlns:ma="http://schemas.microsoft.com/office/2006/metadata/properties/metaAttributes" ct:_="" ma:_="" ma:contentTypeName="Document" ma:contentTypeID="0x0101001B5D77D607908149A1C7D42DB9E74425" ma:contentTypeVersion="7" ma:contentTypeDescription="Create a new document." ma:contentTypeScope="" ma:versionID="566d1960f5a05db71ca618f814dd7de3">
-  <xsd:schema xmlns:xsd="http://www.w3.org/2001/XMLSchema" xmlns:xs="http://www.w3.org/2001/XMLSchema" xmlns:p="http://schemas.microsoft.com/office/2006/metadata/properties" xmlns:ns2="6a5770f3-c301-40de-9f0e-a8ecc7769aa1" targetNamespace="http://schemas.microsoft.com/office/2006/metadata/properties" ma:root="true" ma:fieldsID="bcbf507bec704c849f0890d149e47673" ns2:_="">
-    <xsd:import namespace="6a5770f3-c301-40de-9f0e-a8ecc7769aa1"/>
-    <xsd:element name="properties">
-      <xsd:complexType>
-        <xsd:sequence>
-          <xsd:element name="documentManagement">
-            <xsd:complexType>
-              <xsd:all>
-                <xsd:element ref="ns2:MediaServiceMetadata" minOccurs="0"/>
-                <xsd:element ref="ns2:MediaServiceFastMetadata" minOccurs="0"/>
-                <xsd:element ref="ns2:MediaServiceDateTaken" minOccurs="0"/>
-                <xsd:element ref="ns2:MediaServiceAutoTags" minOccurs="0"/>
-                <xsd:element ref="ns2:MediaServiceOCR" minOccurs="0"/>
-                <xsd:element ref="ns2:MediaServiceGenerationTime" minOccurs="0"/>
-                <xsd:element ref="ns2:MediaServiceEventHashCode" minOccurs="0"/>
-              </xsd:all>
-            </xsd:complexType>
-          </xsd:element>
-        </xsd:sequence>
-      </xsd:complexType>
-    </xsd:element>
-  </xsd:schema>
-  <xsd:schema xmlns:xsd="http://www.w3.org/2001/XMLSchema" xmlns:xs="http://www.w3.org/2001/XMLSchema" xmlns:dms="http://schemas.microsoft.com/office/2006/documentManagement/types" xmlns:pc="http://schemas.microsoft.com/office/infopath/2007/PartnerControls" targetNamespace="6a5770f3-c301-40de-9f0e-a8ecc7769aa1" elementFormDefault="qualified">
-    <xsd:import namespace="http://schemas.microsoft.com/office/2006/documentManagement/types"/>
-    <xsd:import namespace="http://schemas.microsoft.com/office/infopath/2007/PartnerControls"/>
-    <xsd:element name="MediaServiceMetadata" ma:index="8" nillable="true" ma:displayName="MediaServiceMetadata" ma:hidden="true" ma:internalName="MediaServiceMetadata" ma:readOnly="true">
-      <xsd:simpleType>
-        <xsd:restriction base="dms:Note"/>
-      </xsd:simpleType>
-    </xsd:element>
-    <xsd:element name="MediaServiceFastMetadata" ma:index="9" nillable="true" ma:displayName="MediaServiceFastMetadata" ma:hidden="true" ma:internalName="MediaServiceFastMetadata" ma:readOnly="true">
-      <xsd:simpleType>
-        <xsd:restriction base="dms:Note"/>
-      </xsd:simpleType>
-    </xsd:element>
-    <xsd:element name="MediaServiceDateTaken" ma:index="10" nillable="true" ma:displayName="MediaServiceDateTaken" ma:hidden="true" ma:internalName="MediaServiceDateTaken" ma:readOnly="true">
-      <xsd:simpleType>
-        <xsd:restriction base="dms:Text"/>
-      </xsd:simpleType>
-    </xsd:element>
-    <xsd:element name="MediaServiceAutoTags" ma:index="11" nillable="true" ma:displayName="Tags" ma:internalName="MediaServiceAutoTags" ma:readOnly="true">
-      <xsd:simpleType>
-        <xsd:restriction base="dms:Text"/>
-      </xsd:simpleType>
-    </xsd:element>
-    <xsd:element name="MediaServiceOCR" ma:index="12" nillable="true" ma:displayName="Extracted Text" ma:internalName="MediaServiceOCR" ma:readOnly="true">
-      <xsd:simpleType>
-        <xsd:restriction base="dms:Note">
-          <xsd:maxLength value="255"/>
-        </xsd:restriction>
-      </xsd:simpleType>
-    </xsd:element>
-    <xsd:element name="MediaServiceGenerationTime" ma:index="13" nillable="true" ma:displayName="MediaServiceGenerationTime" ma:hidden="true" ma:internalName="MediaServiceGenerationTime" ma:readOnly="true">
-      <xsd:simpleType>
-        <xsd:restriction base="dms:Text"/>
-      </xsd:simpleType>
-    </xsd:element>
-    <xsd:element name="MediaServiceEventHashCode" ma:index="14" nillable="true" ma:displayName="MediaServiceEventHashCode" ma:hidden="true" ma:internalName="MediaServiceEventHashCode" ma:readOnly="true">
-      <xsd:simpleType>
-        <xsd:restriction base="dms:Text"/>
-      </xsd:simpleType>
-    </xsd:element>
-  </xsd:schema>
-  <xsd:schema xmlns="http://schemas.openxmlformats.org/package/2006/metadata/core-properties" xmlns:xsd="http://www.w3.org/2001/XMLSchema" xmlns:xsi="http://www.w3.org/2001/XMLSchema-instance" xmlns:dc="http://purl.org/dc/elements/1.1/" xmlns:dcterms="http://purl.org/dc/terms/" xmlns:odoc="http://schemas.microsoft.com/internal/obd" targetNamespace="http://schemas.openxmlformats.org/package/2006/metadata/core-properties" elementFormDefault="qualified" attributeFormDefault="unqualified" blockDefault="#all">
-    <xsd:import namespace="http://purl.org/dc/elements/1.1/" schemaLocation="http://dublincore.org/schemas/xmls/qdc/2003/04/02/dc.xsd"/>
-    <xsd:import namespace="http://purl.org/dc/terms/" schemaLocation="http://dublincore.org/schemas/xmls/qdc/2003/04/02/dcterms.xsd"/>
-    <xsd:element name="coreProperties" type="CT_coreProperties"/>
-    <xsd:complexType name="CT_coreProperties">
-      <xsd:all>
-        <xsd:element ref="dc:creator" minOccurs="0" maxOccurs="1"/>
-        <xsd:element ref="dcterms:created" minOccurs="0" maxOccurs="1"/>
-        <xsd:element ref="dc:identifier" minOccurs="0" maxOccurs="1"/>
-        <xsd:element name="contentType" minOccurs="0" maxOccurs="1" type="xsd:string" ma:index="0" ma:displayName="Content Type"/>
-        <xsd:element ref="dc:title" minOccurs="0" maxOccurs="1" ma:index="4" ma:displayName="Title"/>
-        <xsd:element ref="dc:subject" minOccurs="0" maxOccurs="1"/>
-        <xsd:element ref="dc:description" minOccurs="0" maxOccurs="1"/>
-        <xsd:element name="keywords" minOccurs="0" maxOccurs="1" type="xsd:string"/>
-        <xsd:element ref="dc:language" minOccurs="0" maxOccurs="1"/>
-        <xsd:element name="category" minOccurs="0" maxOccurs="1" type="xsd:string"/>
-        <xsd:element name="version" minOccurs="0" maxOccurs="1" type="xsd:string"/>
-        <xsd:element name="revision" minOccurs="0" maxOccurs="1" type="xsd:string">
-          <xsd:annotation>
-            <xsd:documentation>
-                        This value indicates the number of saves or revisions. The application is responsible for updating this value after each revision.
-                    </xsd:documentation>
-          </xsd:annotation>
-        </xsd:element>
-        <xsd:element name="lastModifiedBy" minOccurs="0" maxOccurs="1" type="xsd:string"/>
-        <xsd:element ref="dcterms:modified" minOccurs="0" maxOccurs="1"/>
-        <xsd:element name="contentStatus" minOccurs="0" maxOccurs="1" type="xsd:string"/>
-      </xsd:all>
-    </xsd:complexType>
-  </xsd:schema>
-  <xs:schema xmlns:pc="http://schemas.microsoft.com/office/infopath/2007/PartnerControls" xmlns:xs="http://www.w3.org/2001/XMLSchema" targetNamespace="http://schemas.microsoft.com/office/infopath/2007/PartnerControls" elementFormDefault="qualified" attributeFormDefault="unqualified">
-    <xs:element name="Person">
-      <xs:complexType>
-        <xs:sequence>
-          <xs:element ref="pc:DisplayName" minOccurs="0"/>
-          <xs:element ref="pc:AccountId" minOccurs="0"/>
-          <xs:element ref="pc:AccountType" minOccurs="0"/>
-        </xs:sequence>
-      </xs:complexType>
-    </xs:element>
-    <xs:element name="DisplayName" type="xs:string"/>
-    <xs:element name="AccountId" type="xs:string"/>
-    <xs:element name="AccountType" type="xs:string"/>
-    <xs:element name="BDCAssociatedEntity">
-      <xs:complexType>
-        <xs:sequence>
-          <xs:element ref="pc:BDCEntity" minOccurs="0" maxOccurs="unbounded"/>
-        </xs:sequence>
-        <xs:attribute ref="pc:EntityNamespace"/>
-        <xs:attribute ref="pc:EntityName"/>
-        <xs:attribute ref="pc:SystemInstanceName"/>
-        <xs:attribute ref="pc:AssociationName"/>
-      </xs:complexType>
-    </xs:element>
-    <xs:attribute name="EntityNamespace" type="xs:string"/>
-    <xs:attribute name="EntityName" type="xs:string"/>
-    <xs:attribute name="SystemInstanceName" type="xs:string"/>
-    <xs:attribute name="AssociationName" type="xs:string"/>
-    <xs:element name="BDCEntity">
-      <xs:complexType>
-        <xs:sequence>
-          <xs:element ref="pc:EntityDisplayName" minOccurs="0"/>
-          <xs:element ref="pc:EntityInstanceReference" minOccurs="0"/>
-          <xs:element ref="pc:EntityId1" minOccurs="0"/>
-          <xs:element ref="pc:EntityId2" minOccurs="0"/>
-          <xs:element ref="pc:EntityId3" minOccurs="0"/>
-          <xs:element ref="pc:EntityId4" minOccurs="0"/>
-          <xs:element ref="pc:EntityId5" minOccurs="0"/>
-        </xs:sequence>
-      </xs:complexType>
-    </xs:element>
-    <xs:element name="EntityDisplayName" type="xs:string"/>
-    <xs:element name="EntityInstanceReference" type="xs:string"/>
-    <xs:element name="EntityId1" type="xs:string"/>
-    <xs:element name="EntityId2" type="xs:string"/>
-    <xs:element name="EntityId3" type="xs:string"/>
-    <xs:element name="EntityId4" type="xs:string"/>
-    <xs:element name="EntityId5" type="xs:string"/>
-    <xs:element name="Terms">
-      <xs:complexType>
-        <xs:sequence>
-          <xs:element ref="pc:TermInfo" minOccurs="0" maxOccurs="unbounded"/>
-        </xs:sequence>
-      </xs:complexType>
-    </xs:element>
-    <xs:element name="TermInfo">
-      <xs:complexType>
-        <xs:sequence>
-          <xs:element ref="pc:TermName" minOccurs="0"/>
-          <xs:element ref="pc:TermId" minOccurs="0"/>
-        </xs:sequence>
-      </xs:complexType>
-    </xs:element>
-    <xs:element name="TermName" type="xs:string"/>
-    <xs:element name="TermId" type="xs:string"/>
-  </xs:schema>
-</ct:contentTypeSchema>
-</file>
-
-<file path=customXml/item2.xml><?xml version="1.0" encoding="utf-8"?>
-<?mso-contentType ?>
-<FormTemplates xmlns="http://schemas.microsoft.com/sharepoint/v3/contenttype/forms">
-  <Display>DocumentLibraryForm</Display>
-  <Edit>DocumentLibraryForm</Edit>
-  <New>DocumentLibraryForm</New>
-</FormTemplates>
-</file>
-
-<file path=customXml/item3.xml><?xml version="1.0" encoding="utf-8"?>
-<p:properties xmlns:p="http://schemas.microsoft.com/office/2006/metadata/properties" xmlns:xsi="http://www.w3.org/2001/XMLSchema-instance" xmlns:pc="http://schemas.microsoft.com/office/infopath/2007/PartnerControls">
-  <documentManagement/>
-</p:properties>
-</file>
-
-<file path=customXml/itemProps1.xml><?xml version="1.0" encoding="utf-8"?>
-<ds:datastoreItem xmlns:ds="http://schemas.openxmlformats.org/officeDocument/2006/customXml" ds:itemID="{3574FAE1-78ED-4755-A256-A5C8CAE57318}"/>
-</file>
-
-<file path=customXml/itemProps2.xml><?xml version="1.0" encoding="utf-8"?>
-<ds:datastoreItem xmlns:ds="http://schemas.openxmlformats.org/officeDocument/2006/customXml" ds:itemID="{D2E51EA1-56CC-401F-8D3B-A6358656114E}"/>
-</file>
-
-<file path=customXml/itemProps3.xml><?xml version="1.0" encoding="utf-8"?>
-<ds:datastoreItem xmlns:ds="http://schemas.openxmlformats.org/officeDocument/2006/customXml" ds:itemID="{C8E0C203-EC74-41DE-80CD-C454E4F06175}"/>
 </file>
</xml_diff>